<commit_message>
Finished Dot Net Essentials PPTs
</commit_message>
<xml_diff>
--- a/slides/OOPC/OOPC - Chapter5.pptx
+++ b/slides/OOPC/OOPC - Chapter5.pptx
@@ -5,17 +5,21 @@
     <p:sldMasterId id="2147483807" r:id="rId1"/>
   </p:sldMasterIdLst>
   <p:notesMasterIdLst>
-    <p:notesMasterId r:id="rId7"/>
+    <p:notesMasterId r:id="rId11"/>
   </p:notesMasterIdLst>
   <p:handoutMasterIdLst>
-    <p:handoutMasterId r:id="rId8"/>
+    <p:handoutMasterId r:id="rId12"/>
   </p:handoutMasterIdLst>
   <p:sldIdLst>
     <p:sldId id="793" r:id="rId2"/>
     <p:sldId id="804" r:id="rId3"/>
     <p:sldId id="795" r:id="rId4"/>
     <p:sldId id="855" r:id="rId5"/>
-    <p:sldId id="794" r:id="rId6"/>
+    <p:sldId id="856" r:id="rId6"/>
+    <p:sldId id="858" r:id="rId7"/>
+    <p:sldId id="857" r:id="rId8"/>
+    <p:sldId id="859" r:id="rId9"/>
+    <p:sldId id="794" r:id="rId10"/>
   </p:sldIdLst>
   <p:sldSz cx="24385588" cy="13717588"/>
   <p:notesSz cx="6858000" cy="9144000"/>
@@ -342,7 +346,7 @@
           <a:p>
             <a:fld id="{9DEB306A-FE1C-4996-AB92-3C76DD2CBDB3}" type="datetimeFigureOut">
               <a:rPr lang="es-SV" smtClean="0"/>
-              <a:t>15/10/17</a:t>
+              <a:t>29/10/17</a:t>
             </a:fld>
             <a:endParaRPr lang="es-SV"/>
           </a:p>
@@ -507,7 +511,7 @@
           <a:p>
             <a:fld id="{01993A81-F12D-42C5-A35C-8AABE483B59D}" type="datetimeFigureOut">
               <a:rPr lang="es-MX" smtClean="0"/>
-              <a:t>15/10/17</a:t>
+              <a:t>29/10/17</a:t>
             </a:fld>
             <a:endParaRPr lang="es-MX"/>
           </a:p>
@@ -934,6 +938,90 @@
     <p:extLst>
       <p:ext uri="{BB962C8B-B14F-4D97-AF65-F5344CB8AC3E}">
         <p14:creationId xmlns:p14="http://schemas.microsoft.com/office/powerpoint/2010/main" val="59948189"/>
+      </p:ext>
+    </p:extLst>
+  </p:cSld>
+  <p:clrMapOvr>
+    <a:masterClrMapping/>
+  </p:clrMapOvr>
+</p:notes>
+</file>
+
+<file path=ppt/notesSlides/notesSlide3.xml><?xml version="1.0" encoding="utf-8"?>
+<p:notes xmlns:a="http://schemas.openxmlformats.org/drawingml/2006/main" xmlns:r="http://schemas.openxmlformats.org/officeDocument/2006/relationships" xmlns:p="http://schemas.openxmlformats.org/presentationml/2006/main">
+  <p:cSld>
+    <p:spTree>
+      <p:nvGrpSpPr>
+        <p:cNvPr id="1" name=""/>
+        <p:cNvGrpSpPr/>
+        <p:nvPr/>
+      </p:nvGrpSpPr>
+      <p:grpSpPr>
+        <a:xfrm>
+          <a:off x="0" y="0"/>
+          <a:ext cx="0" cy="0"/>
+          <a:chOff x="0" y="0"/>
+          <a:chExt cx="0" cy="0"/>
+        </a:xfrm>
+      </p:grpSpPr>
+      <p:sp>
+        <p:nvSpPr>
+          <p:cNvPr id="2" name="Slide Image Placeholder 1"/>
+          <p:cNvSpPr>
+            <a:spLocks noGrp="1" noRot="1" noChangeAspect="1"/>
+          </p:cNvSpPr>
+          <p:nvPr>
+            <p:ph type="sldImg"/>
+          </p:nvPr>
+        </p:nvSpPr>
+        <p:spPr/>
+      </p:sp>
+      <p:sp>
+        <p:nvSpPr>
+          <p:cNvPr id="3" name="Notes Placeholder 2"/>
+          <p:cNvSpPr>
+            <a:spLocks noGrp="1"/>
+          </p:cNvSpPr>
+          <p:nvPr>
+            <p:ph type="body" idx="1"/>
+          </p:nvPr>
+        </p:nvSpPr>
+        <p:spPr/>
+        <p:txBody>
+          <a:bodyPr/>
+          <a:lstStyle/>
+          <a:p>
+            <a:endParaRPr lang="en-US" dirty="0"/>
+          </a:p>
+        </p:txBody>
+      </p:sp>
+      <p:sp>
+        <p:nvSpPr>
+          <p:cNvPr id="4" name="Slide Number Placeholder 3"/>
+          <p:cNvSpPr>
+            <a:spLocks noGrp="1"/>
+          </p:cNvSpPr>
+          <p:nvPr>
+            <p:ph type="sldNum" sz="quarter" idx="10"/>
+          </p:nvPr>
+        </p:nvSpPr>
+        <p:spPr/>
+        <p:txBody>
+          <a:bodyPr/>
+          <a:lstStyle/>
+          <a:p>
+            <a:fld id="{69BC2EFC-28F3-48C0-BF6B-230A53BCFDFC}" type="slidenum">
+              <a:rPr lang="es-MX" smtClean="0"/>
+              <a:t>7</a:t>
+            </a:fld>
+            <a:endParaRPr lang="es-MX"/>
+          </a:p>
+        </p:txBody>
+      </p:sp>
+    </p:spTree>
+    <p:extLst>
+      <p:ext uri="{BB962C8B-B14F-4D97-AF65-F5344CB8AC3E}">
+        <p14:creationId xmlns:p14="http://schemas.microsoft.com/office/powerpoint/2010/main" val="526348065"/>
       </p:ext>
     </p:extLst>
   </p:cSld>
@@ -6634,15 +6722,6 @@
               </a:rPr>
               <a:t>Code Organization in C# and Module Review</a:t>
             </a:r>
-            <a:endParaRPr lang="en-US" sz="6600" dirty="0">
-              <a:solidFill>
-                <a:schemeClr val="accent3">
-                  <a:lumMod val="75000"/>
-                </a:schemeClr>
-              </a:solidFill>
-              <a:ea typeface="Open Sans Semibold" panose="020B0706030804020204" pitchFamily="34" charset="0"/>
-              <a:cs typeface="Open Sans Semibold" panose="020B0706030804020204" pitchFamily="34" charset="0"/>
-            </a:endParaRPr>
           </a:p>
         </p:txBody>
       </p:sp>
@@ -16635,10 +16714,6 @@
               </a:rPr>
               <a:t>Module Review and Questions</a:t>
             </a:r>
-            <a:endParaRPr lang="en-US" sz="4000" dirty="0">
-              <a:ea typeface="Open Sans" panose="020B0606030504020204" pitchFamily="34" charset="0"/>
-              <a:cs typeface="Open Sans" panose="020B0606030504020204" pitchFamily="34" charset="0"/>
-            </a:endParaRPr>
           </a:p>
         </p:txBody>
       </p:sp>
@@ -18326,7 +18401,7 @@
                 <a:ea typeface="Open Sans Semibold" panose="020B0706030804020204" pitchFamily="34" charset="0"/>
                 <a:cs typeface="Open Sans Semibold" panose="020B0706030804020204" pitchFamily="34" charset="0"/>
               </a:rPr>
-              <a:t>Title</a:t>
+              <a:t>Code Organization &amp; Namespaces</a:t>
             </a:r>
             <a:endParaRPr lang="en-US" sz="4400" dirty="0">
               <a:solidFill>
@@ -18349,7 +18424,7 @@
         <p:spPr>
           <a:xfrm>
             <a:off x="2246688" y="1955687"/>
-            <a:ext cx="4410491" cy="0"/>
+            <a:ext cx="7965886" cy="0"/>
           </a:xfrm>
           <a:prstGeom prst="line">
             <a:avLst/>
@@ -18384,7 +18459,7 @@
         <p:spPr>
           <a:xfrm>
             <a:off x="2246688" y="2855786"/>
-            <a:ext cx="19982220" cy="646331"/>
+            <a:ext cx="19982220" cy="6186309"/>
           </a:xfrm>
           <a:prstGeom prst="rect">
             <a:avLst/>
@@ -18402,8 +18477,130 @@
               <a:buChar char="•"/>
             </a:pPr>
             <a:r>
-              <a:rPr lang="en-US" sz="3600" smtClean="0"/>
-              <a:t>Content</a:t>
+              <a:rPr lang="en-US" sz="3600" dirty="0"/>
+              <a:t>Namespaces are heavily used in C# programming in two </a:t>
+            </a:r>
+            <a:r>
+              <a:rPr lang="en-US" sz="3600" dirty="0" smtClean="0"/>
+              <a:t>ways.</a:t>
+            </a:r>
+          </a:p>
+          <a:p>
+            <a:pPr marL="571500" indent="-571500">
+              <a:buFont typeface="Arial" panose="020B0604020202020204" pitchFamily="34" charset="0"/>
+              <a:buChar char="•"/>
+            </a:pPr>
+            <a:r>
+              <a:rPr lang="en-US" sz="3600" dirty="0" smtClean="0"/>
+              <a:t>First</a:t>
+            </a:r>
+            <a:r>
+              <a:rPr lang="en-US" sz="3600" dirty="0"/>
+              <a:t>, the .NET Framework uses namespaces to organize its many </a:t>
+            </a:r>
+            <a:r>
+              <a:rPr lang="en-US" sz="3600" dirty="0" smtClean="0"/>
+              <a:t>classes.</a:t>
+            </a:r>
+          </a:p>
+          <a:p>
+            <a:pPr marL="571500" indent="-571500">
+              <a:buFont typeface="Arial" panose="020B0604020202020204" pitchFamily="34" charset="0"/>
+              <a:buChar char="•"/>
+            </a:pPr>
+            <a:r>
+              <a:rPr lang="en-US" sz="3600" dirty="0"/>
+              <a:t>Second, declaring your own namespaces can help you control the scope of class and method names in larger programming projects. Use the namespace keyword to declare a </a:t>
+            </a:r>
+            <a:r>
+              <a:rPr lang="en-US" sz="3600" dirty="0" smtClean="0"/>
+              <a:t>namespace.</a:t>
+            </a:r>
+          </a:p>
+          <a:p>
+            <a:pPr marL="571500" indent="-571500">
+              <a:buFont typeface="Arial" panose="020B0604020202020204" pitchFamily="34" charset="0"/>
+              <a:buChar char="•"/>
+            </a:pPr>
+            <a:r>
+              <a:rPr lang="en-US" sz="3600" dirty="0"/>
+              <a:t>Namespaces have the following properties</a:t>
+            </a:r>
+            <a:r>
+              <a:rPr lang="en-US" sz="3600" dirty="0" smtClean="0"/>
+              <a:t>:</a:t>
+            </a:r>
+          </a:p>
+          <a:p>
+            <a:pPr marL="1779783" lvl="1" indent="-571500">
+              <a:buFont typeface="Arial" panose="020B0604020202020204" pitchFamily="34" charset="0"/>
+              <a:buChar char="•"/>
+            </a:pPr>
+            <a:r>
+              <a:rPr lang="en-US" sz="3600" dirty="0" smtClean="0"/>
+              <a:t>They </a:t>
+            </a:r>
+            <a:r>
+              <a:rPr lang="en-US" sz="3600" dirty="0"/>
+              <a:t>organize large code projects</a:t>
+            </a:r>
+            <a:r>
+              <a:rPr lang="en-US" sz="3600" dirty="0" smtClean="0"/>
+              <a:t>.</a:t>
+            </a:r>
+          </a:p>
+          <a:p>
+            <a:pPr marL="1779783" lvl="1" indent="-571500">
+              <a:buFont typeface="Arial" panose="020B0604020202020204" pitchFamily="34" charset="0"/>
+              <a:buChar char="•"/>
+            </a:pPr>
+            <a:r>
+              <a:rPr lang="en-US" sz="3600" dirty="0" smtClean="0"/>
+              <a:t>They </a:t>
+            </a:r>
+            <a:r>
+              <a:rPr lang="en-US" sz="3600" dirty="0"/>
+              <a:t>are delimited by using the . operator</a:t>
+            </a:r>
+            <a:r>
+              <a:rPr lang="en-US" sz="3600" dirty="0" smtClean="0"/>
+              <a:t>.</a:t>
+            </a:r>
+          </a:p>
+          <a:p>
+            <a:pPr marL="1779783" lvl="1" indent="-571500">
+              <a:buFont typeface="Arial" panose="020B0604020202020204" pitchFamily="34" charset="0"/>
+              <a:buChar char="•"/>
+            </a:pPr>
+            <a:r>
+              <a:rPr lang="en-US" sz="3600" dirty="0" smtClean="0"/>
+              <a:t>The </a:t>
+            </a:r>
+            <a:r>
+              <a:rPr lang="en-US" sz="3600" dirty="0"/>
+              <a:t>using directive obviates the requirement to specify the name of the namespace for every class</a:t>
+            </a:r>
+            <a:r>
+              <a:rPr lang="en-US" sz="3600" dirty="0" smtClean="0"/>
+              <a:t>.</a:t>
+            </a:r>
+          </a:p>
+          <a:p>
+            <a:pPr marL="1779783" lvl="1" indent="-571500">
+              <a:buFont typeface="Arial" panose="020B0604020202020204" pitchFamily="34" charset="0"/>
+              <a:buChar char="•"/>
+            </a:pPr>
+            <a:r>
+              <a:rPr lang="en-US" sz="3600" dirty="0" smtClean="0"/>
+              <a:t>The </a:t>
+            </a:r>
+            <a:r>
+              <a:rPr lang="en-US" sz="3600" dirty="0"/>
+              <a:t>global namespace is the "root" namespace: global::System will always refer to the .NET Framework namespace </a:t>
+            </a:r>
+            <a:r>
+              <a:rPr lang="en-US" sz="3600" dirty="0" smtClean="0"/>
+              <a:t>“System”.</a:t>
             </a:r>
             <a:endParaRPr lang="en-US" sz="3600" dirty="0"/>
           </a:p>
@@ -18842,7 +19039,19 @@
                 <a:ea typeface="Open Sans Semibold" panose="020B0706030804020204" pitchFamily="34" charset="0"/>
                 <a:cs typeface="Open Sans Semibold" panose="020B0706030804020204" pitchFamily="34" charset="0"/>
               </a:rPr>
-              <a:t>Example: C# Value Types</a:t>
+              <a:t>Example: C# </a:t>
+            </a:r>
+            <a:r>
+              <a:rPr lang="en-US" sz="6600" dirty="0" smtClean="0">
+                <a:solidFill>
+                  <a:schemeClr val="accent3">
+                    <a:lumMod val="75000"/>
+                  </a:schemeClr>
+                </a:solidFill>
+                <a:ea typeface="Open Sans Semibold" panose="020B0706030804020204" pitchFamily="34" charset="0"/>
+                <a:cs typeface="Open Sans Semibold" panose="020B0706030804020204" pitchFamily="34" charset="0"/>
+              </a:rPr>
+              <a:t>Namespaces</a:t>
             </a:r>
             <a:endParaRPr lang="en-US" sz="6600" dirty="0">
               <a:solidFill>
@@ -18884,19 +19093,15 @@
             </a:pPr>
             <a:r>
               <a:rPr lang="en-US" sz="3600" dirty="0" smtClean="0"/>
-              <a:t>See OOPC-Chapter2 (</a:t>
+              <a:t>See </a:t>
+            </a:r>
+            <a:r>
+              <a:rPr lang="en-US" sz="3600" dirty="0" smtClean="0"/>
+              <a:t>OOPC-Chapter5 (</a:t>
             </a:r>
             <a:r>
               <a:rPr lang="en-US" sz="3600" dirty="0" err="1" smtClean="0"/>
-              <a:t>ValueTypes.cs</a:t>
-            </a:r>
-            <a:r>
-              <a:rPr lang="en-US" sz="3600" dirty="0" smtClean="0"/>
-              <a:t>) and (</a:t>
-            </a:r>
-            <a:r>
-              <a:rPr lang="en-US" sz="3600" dirty="0" err="1" smtClean="0"/>
-              <a:t>BoxingUnboxing.cs</a:t>
+              <a:t>Namespaces.cs</a:t>
             </a:r>
             <a:r>
               <a:rPr lang="en-US" sz="3600" dirty="0" smtClean="0"/>
@@ -18916,7 +19121,11 @@
               <a:rPr lang="en-US" sz="3600" dirty="0" smtClean="0">
                 <a:hlinkClick r:id="rId3"/>
               </a:rPr>
-              <a:t>github.com/DotNetTraining/DotNetEssentials/tree/master/Code/OOPC/OOPC-Chapter2</a:t>
+              <a:t>github.com/DotNetTraining/DotNetEssentials/tree/master/Code/OOPC/OOPC-Chapter5</a:t>
+            </a:r>
+            <a:r>
+              <a:rPr lang="en-US" sz="3600" dirty="0" smtClean="0"/>
+              <a:t> </a:t>
             </a:r>
             <a:endParaRPr lang="en-US" sz="3600" dirty="0" smtClean="0"/>
           </a:p>
@@ -20308,6 +20517,3323 @@
       </p:grpSpPr>
       <p:sp>
         <p:nvSpPr>
+          <p:cNvPr id="33" name="Marcador de texto 4"/>
+          <p:cNvSpPr txBox="1">
+            <a:spLocks/>
+          </p:cNvSpPr>
+          <p:nvPr/>
+        </p:nvSpPr>
+        <p:spPr>
+          <a:xfrm>
+            <a:off x="2246688" y="1053149"/>
+            <a:ext cx="17101901" cy="1802637"/>
+          </a:xfrm>
+          <a:prstGeom prst="rect">
+            <a:avLst/>
+          </a:prstGeom>
+        </p:spPr>
+        <p:txBody>
+          <a:bodyPr/>
+          <a:lstStyle>
+            <a:lvl1pPr marL="0" indent="0" algn="l" defTabSz="1812040" rtl="0" eaLnBrk="1" latinLnBrk="0" hangingPunct="1">
+              <a:spcBef>
+                <a:spcPct val="20000"/>
+              </a:spcBef>
+              <a:spcAft>
+                <a:spcPts val="1199"/>
+              </a:spcAft>
+              <a:buFont typeface="Arial" pitchFamily="34" charset="0"/>
+              <a:buNone/>
+              <a:defRPr sz="4000" b="1" kern="1200">
+                <a:solidFill>
+                  <a:schemeClr val="tx1"/>
+                </a:solidFill>
+                <a:latin typeface="+mn-lt"/>
+                <a:ea typeface="+mn-ea"/>
+                <a:cs typeface="+mn-cs"/>
+              </a:defRPr>
+            </a:lvl1pPr>
+            <a:lvl2pPr marL="906009" indent="-362365" algn="l" defTabSz="1812040" rtl="0" eaLnBrk="1" latinLnBrk="0" hangingPunct="1">
+              <a:spcBef>
+                <a:spcPct val="20000"/>
+              </a:spcBef>
+              <a:buClr>
+                <a:schemeClr val="tx2"/>
+              </a:buClr>
+              <a:buFont typeface="Arial" pitchFamily="34" charset="0"/>
+              <a:buChar char="•"/>
+              <a:defRPr sz="4000" kern="1200">
+                <a:solidFill>
+                  <a:schemeClr val="tx1"/>
+                </a:solidFill>
+                <a:latin typeface="+mn-lt"/>
+                <a:ea typeface="+mn-ea"/>
+                <a:cs typeface="+mn-cs"/>
+              </a:defRPr>
+            </a:lvl2pPr>
+            <a:lvl3pPr marL="2265040" indent="-453004" algn="l" defTabSz="1812040" rtl="0" eaLnBrk="1" latinLnBrk="0" hangingPunct="1">
+              <a:spcBef>
+                <a:spcPct val="20000"/>
+              </a:spcBef>
+              <a:buClr>
+                <a:schemeClr val="tx2"/>
+              </a:buClr>
+              <a:buFont typeface="Arial" pitchFamily="34" charset="0"/>
+              <a:buChar char="•"/>
+              <a:defRPr sz="3702" kern="1200">
+                <a:solidFill>
+                  <a:schemeClr val="tx1"/>
+                </a:solidFill>
+                <a:latin typeface="+mn-lt"/>
+                <a:ea typeface="+mn-ea"/>
+                <a:cs typeface="+mn-cs"/>
+              </a:defRPr>
+            </a:lvl3pPr>
+            <a:lvl4pPr marL="3171046" indent="-453004" algn="l" defTabSz="1812040" rtl="0" eaLnBrk="1" latinLnBrk="0" hangingPunct="1">
+              <a:spcBef>
+                <a:spcPct val="20000"/>
+              </a:spcBef>
+              <a:buClr>
+                <a:schemeClr val="tx2"/>
+              </a:buClr>
+              <a:buFont typeface="Arial" pitchFamily="34" charset="0"/>
+              <a:buChar char="•"/>
+              <a:defRPr sz="3702" kern="1200">
+                <a:solidFill>
+                  <a:schemeClr val="tx1"/>
+                </a:solidFill>
+                <a:latin typeface="+mn-lt"/>
+                <a:ea typeface="+mn-ea"/>
+                <a:cs typeface="+mn-cs"/>
+              </a:defRPr>
+            </a:lvl4pPr>
+            <a:lvl5pPr marL="4077068" indent="-453004" algn="l" defTabSz="1812040" rtl="0" eaLnBrk="1" latinLnBrk="0" hangingPunct="1">
+              <a:spcBef>
+                <a:spcPct val="20000"/>
+              </a:spcBef>
+              <a:buClr>
+                <a:schemeClr val="tx2"/>
+              </a:buClr>
+              <a:buFont typeface="Arial" pitchFamily="34" charset="0"/>
+              <a:buChar char="•"/>
+              <a:defRPr sz="3702" kern="1200" baseline="0">
+                <a:solidFill>
+                  <a:schemeClr val="tx1"/>
+                </a:solidFill>
+                <a:latin typeface="+mn-lt"/>
+                <a:ea typeface="+mn-ea"/>
+                <a:cs typeface="+mn-cs"/>
+              </a:defRPr>
+            </a:lvl5pPr>
+            <a:lvl6pPr marL="4983081" indent="-453004" algn="l" defTabSz="1812040" rtl="0" eaLnBrk="1" latinLnBrk="0" hangingPunct="1">
+              <a:spcBef>
+                <a:spcPct val="20000"/>
+              </a:spcBef>
+              <a:buClr>
+                <a:schemeClr val="tx2"/>
+              </a:buClr>
+              <a:buFont typeface="Arial" pitchFamily="34" charset="0"/>
+              <a:buChar char="•"/>
+              <a:defRPr sz="3200" kern="1200">
+                <a:solidFill>
+                  <a:schemeClr val="tx1"/>
+                </a:solidFill>
+                <a:latin typeface="+mn-lt"/>
+                <a:ea typeface="+mn-ea"/>
+                <a:cs typeface="+mn-cs"/>
+              </a:defRPr>
+            </a:lvl6pPr>
+            <a:lvl7pPr marL="5889088" indent="-453004" algn="l" defTabSz="1812040" rtl="0" eaLnBrk="1" latinLnBrk="0" hangingPunct="1">
+              <a:spcBef>
+                <a:spcPct val="20000"/>
+              </a:spcBef>
+              <a:buClr>
+                <a:schemeClr val="tx2"/>
+              </a:buClr>
+              <a:buFont typeface="Arial" pitchFamily="34" charset="0"/>
+              <a:buChar char="•"/>
+              <a:defRPr sz="3200" kern="1200">
+                <a:solidFill>
+                  <a:schemeClr val="tx1"/>
+                </a:solidFill>
+                <a:latin typeface="+mn-lt"/>
+                <a:ea typeface="+mn-ea"/>
+                <a:cs typeface="+mn-cs"/>
+              </a:defRPr>
+            </a:lvl7pPr>
+            <a:lvl8pPr marL="6795112" indent="-453004" algn="l" defTabSz="1812040" rtl="0" eaLnBrk="1" latinLnBrk="0" hangingPunct="1">
+              <a:spcBef>
+                <a:spcPct val="20000"/>
+              </a:spcBef>
+              <a:buClr>
+                <a:schemeClr val="tx2"/>
+              </a:buClr>
+              <a:buFont typeface="Arial" pitchFamily="34" charset="0"/>
+              <a:buChar char="•"/>
+              <a:defRPr sz="3200" kern="1200">
+                <a:solidFill>
+                  <a:schemeClr val="tx1"/>
+                </a:solidFill>
+                <a:latin typeface="+mn-lt"/>
+                <a:ea typeface="+mn-ea"/>
+                <a:cs typeface="+mn-cs"/>
+              </a:defRPr>
+            </a:lvl8pPr>
+            <a:lvl9pPr marL="7701118" indent="-453004" algn="l" defTabSz="1812040" rtl="0" eaLnBrk="1" latinLnBrk="0" hangingPunct="1">
+              <a:spcBef>
+                <a:spcPct val="20000"/>
+              </a:spcBef>
+              <a:buClr>
+                <a:schemeClr val="tx2"/>
+              </a:buClr>
+              <a:buFont typeface="Arial" pitchFamily="34" charset="0"/>
+              <a:buChar char="•"/>
+              <a:defRPr sz="3200" kern="1200">
+                <a:solidFill>
+                  <a:schemeClr val="tx1"/>
+                </a:solidFill>
+                <a:latin typeface="+mn-lt"/>
+                <a:ea typeface="+mn-ea"/>
+                <a:cs typeface="+mn-cs"/>
+              </a:defRPr>
+            </a:lvl9pPr>
+          </a:lstStyle>
+          <a:p>
+            <a:r>
+              <a:rPr lang="en-US" sz="4400" dirty="0" smtClean="0">
+                <a:solidFill>
+                  <a:schemeClr val="accent3">
+                    <a:lumMod val="75000"/>
+                  </a:schemeClr>
+                </a:solidFill>
+                <a:ea typeface="Open Sans Semibold" panose="020B0706030804020204" pitchFamily="34" charset="0"/>
+                <a:cs typeface="Open Sans Semibold" panose="020B0706030804020204" pitchFamily="34" charset="0"/>
+              </a:rPr>
+              <a:t>Xml Documentation Comments</a:t>
+            </a:r>
+            <a:endParaRPr lang="en-US" sz="4400" dirty="0">
+              <a:solidFill>
+                <a:schemeClr val="accent3">
+                  <a:lumMod val="75000"/>
+                </a:schemeClr>
+              </a:solidFill>
+              <a:ea typeface="Open Sans Semibold" panose="020B0706030804020204" pitchFamily="34" charset="0"/>
+              <a:cs typeface="Open Sans Semibold" panose="020B0706030804020204" pitchFamily="34" charset="0"/>
+            </a:endParaRPr>
+          </a:p>
+        </p:txBody>
+      </p:sp>
+      <p:cxnSp>
+        <p:nvCxnSpPr>
+          <p:cNvPr id="34" name="10 Conector recto"/>
+          <p:cNvCxnSpPr/>
+          <p:nvPr/>
+        </p:nvCxnSpPr>
+        <p:spPr>
+          <a:xfrm>
+            <a:off x="2246688" y="1955687"/>
+            <a:ext cx="7470831" cy="0"/>
+          </a:xfrm>
+          <a:prstGeom prst="line">
+            <a:avLst/>
+          </a:prstGeom>
+          <a:ln w="57150">
+            <a:solidFill>
+              <a:srgbClr val="C00000"/>
+            </a:solidFill>
+          </a:ln>
+        </p:spPr>
+        <p:style>
+          <a:lnRef idx="1">
+            <a:schemeClr val="accent1"/>
+          </a:lnRef>
+          <a:fillRef idx="0">
+            <a:schemeClr val="accent1"/>
+          </a:fillRef>
+          <a:effectRef idx="0">
+            <a:schemeClr val="accent1"/>
+          </a:effectRef>
+          <a:fontRef idx="minor">
+            <a:schemeClr val="tx1"/>
+          </a:fontRef>
+        </p:style>
+      </p:cxnSp>
+      <p:sp>
+        <p:nvSpPr>
+          <p:cNvPr id="35" name="TextBox 34"/>
+          <p:cNvSpPr txBox="1"/>
+          <p:nvPr/>
+        </p:nvSpPr>
+        <p:spPr>
+          <a:xfrm>
+            <a:off x="2246688" y="2855786"/>
+            <a:ext cx="19982220" cy="7848302"/>
+          </a:xfrm>
+          <a:prstGeom prst="rect">
+            <a:avLst/>
+          </a:prstGeom>
+          <a:noFill/>
+        </p:spPr>
+        <p:txBody>
+          <a:bodyPr wrap="square" rtlCol="0">
+            <a:spAutoFit/>
+          </a:bodyPr>
+          <a:lstStyle/>
+          <a:p>
+            <a:pPr marL="571500" indent="-571500">
+              <a:buFont typeface="Arial" panose="020B0604020202020204" pitchFamily="34" charset="0"/>
+              <a:buChar char="•"/>
+            </a:pPr>
+            <a:r>
+              <a:rPr lang="en-US" sz="3600" dirty="0"/>
+              <a:t>In Visual C# you can create documentation for your code by including XML elements in special comment fields (indicated by triple slashes) in the source code directly before the code block to which the comments </a:t>
+            </a:r>
+            <a:r>
+              <a:rPr lang="en-US" sz="3600" dirty="0" smtClean="0"/>
+              <a:t>refer.</a:t>
+            </a:r>
+          </a:p>
+          <a:p>
+            <a:pPr marL="571500" indent="-571500">
+              <a:buFont typeface="Arial" panose="020B0604020202020204" pitchFamily="34" charset="0"/>
+              <a:buChar char="•"/>
+            </a:pPr>
+            <a:r>
+              <a:rPr lang="en-US" sz="3600" dirty="0"/>
+              <a:t>When you compile with the /doc option, the compiler will search for all XML tags in the source code and create an XML documentation file. To create the final documentation based on the compiler-generated file, you can create a custom tool or use a tool such as </a:t>
+            </a:r>
+            <a:r>
+              <a:rPr lang="en-US" sz="3600" dirty="0">
+                <a:hlinkClick r:id="rId2"/>
+              </a:rPr>
+              <a:t>Sandcastle</a:t>
+            </a:r>
+            <a:r>
+              <a:rPr lang="en-US" sz="3600" dirty="0" smtClean="0"/>
+              <a:t>.</a:t>
+            </a:r>
+          </a:p>
+          <a:p>
+            <a:pPr marL="571500" indent="-571500">
+              <a:buFont typeface="Arial" panose="020B0604020202020204" pitchFamily="34" charset="0"/>
+              <a:buChar char="•"/>
+            </a:pPr>
+            <a:r>
+              <a:rPr lang="en-US" sz="3600" dirty="0"/>
+              <a:t>To refer to XML elements (for example, your function processes specific XML elements that you want to describe in an XML documentation comment), you can use the standard quoting mechanism (&lt; and &gt;). To refer to generic identifiers in code reference (</a:t>
+            </a:r>
+            <a:r>
+              <a:rPr lang="en-US" sz="3600" dirty="0" err="1"/>
+              <a:t>cref</a:t>
+            </a:r>
+            <a:r>
+              <a:rPr lang="en-US" sz="3600" dirty="0"/>
+              <a:t>) elements, you can use either the escape characters (for example, </a:t>
+            </a:r>
+            <a:r>
+              <a:rPr lang="en-US" sz="3600" dirty="0" err="1"/>
+              <a:t>cref</a:t>
+            </a:r>
+            <a:r>
+              <a:rPr lang="en-US" sz="3600" dirty="0"/>
+              <a:t>="List&lt;T&gt;") or braces (</a:t>
+            </a:r>
+            <a:r>
+              <a:rPr lang="en-US" sz="3600" dirty="0" err="1"/>
+              <a:t>cref</a:t>
+            </a:r>
+            <a:r>
+              <a:rPr lang="en-US" sz="3600" dirty="0"/>
+              <a:t>="List{T}"). As a special case, the compiler parses the braces as angle brackets to make the documentation comment less cumbersome to author when referring to generic identifiers</a:t>
+            </a:r>
+            <a:r>
+              <a:rPr lang="en-US" sz="3600" dirty="0" smtClean="0"/>
+              <a:t>.</a:t>
+            </a:r>
+          </a:p>
+          <a:p>
+            <a:pPr marL="571500" indent="-571500">
+              <a:buFont typeface="Arial" panose="020B0604020202020204" pitchFamily="34" charset="0"/>
+              <a:buChar char="•"/>
+            </a:pPr>
+            <a:endParaRPr lang="en-US" sz="3600" dirty="0" smtClean="0"/>
+          </a:p>
+          <a:p>
+            <a:pPr marL="571500" indent="-571500">
+              <a:buFont typeface="Arial" panose="020B0604020202020204" pitchFamily="34" charset="0"/>
+              <a:buChar char="•"/>
+            </a:pPr>
+            <a:endParaRPr lang="en-US" sz="3600" dirty="0"/>
+          </a:p>
+        </p:txBody>
+      </p:sp>
+    </p:spTree>
+    <p:extLst>
+      <p:ext uri="{BB962C8B-B14F-4D97-AF65-F5344CB8AC3E}">
+        <p14:creationId xmlns:p14="http://schemas.microsoft.com/office/powerpoint/2010/main" val="1612338342"/>
+      </p:ext>
+    </p:extLst>
+  </p:cSld>
+  <p:clrMapOvr>
+    <a:masterClrMapping/>
+  </p:clrMapOvr>
+  <p:timing>
+    <p:tnLst>
+      <p:par>
+        <p:cTn id="1" dur="indefinite" restart="never" nodeType="tmRoot">
+          <p:childTnLst>
+            <p:seq concurrent="1" nextAc="seek">
+              <p:cTn id="2" dur="indefinite" nodeType="mainSeq">
+                <p:childTnLst>
+                  <p:par>
+                    <p:cTn id="3" fill="hold">
+                      <p:stCondLst>
+                        <p:cond delay="indefinite"/>
+                        <p:cond evt="onBegin" delay="0">
+                          <p:tn val="2"/>
+                        </p:cond>
+                      </p:stCondLst>
+                      <p:childTnLst>
+                        <p:par>
+                          <p:cTn id="4" fill="hold">
+                            <p:stCondLst>
+                              <p:cond delay="0"/>
+                            </p:stCondLst>
+                            <p:childTnLst>
+                              <p:par>
+                                <p:cTn id="5" presetID="2" presetClass="entr" presetSubtype="8" decel="100000" fill="hold" grpId="0" nodeType="withEffect">
+                                  <p:stCondLst>
+                                    <p:cond delay="0"/>
+                                  </p:stCondLst>
+                                  <p:childTnLst>
+                                    <p:set>
+                                      <p:cBhvr>
+                                        <p:cTn id="6" dur="1" fill="hold">
+                                          <p:stCondLst>
+                                            <p:cond delay="0"/>
+                                          </p:stCondLst>
+                                        </p:cTn>
+                                        <p:tgtEl>
+                                          <p:spTgt spid="33"/>
+                                        </p:tgtEl>
+                                        <p:attrNameLst>
+                                          <p:attrName>style.visibility</p:attrName>
+                                        </p:attrNameLst>
+                                      </p:cBhvr>
+                                      <p:to>
+                                        <p:strVal val="visible"/>
+                                      </p:to>
+                                    </p:set>
+                                    <p:anim calcmode="lin" valueType="num">
+                                      <p:cBhvr additive="base">
+                                        <p:cTn id="7" dur="1000" fill="hold"/>
+                                        <p:tgtEl>
+                                          <p:spTgt spid="33"/>
+                                        </p:tgtEl>
+                                        <p:attrNameLst>
+                                          <p:attrName>ppt_x</p:attrName>
+                                        </p:attrNameLst>
+                                      </p:cBhvr>
+                                      <p:tavLst>
+                                        <p:tav tm="0">
+                                          <p:val>
+                                            <p:strVal val="0-#ppt_w/2"/>
+                                          </p:val>
+                                        </p:tav>
+                                        <p:tav tm="100000">
+                                          <p:val>
+                                            <p:strVal val="#ppt_x"/>
+                                          </p:val>
+                                        </p:tav>
+                                      </p:tavLst>
+                                    </p:anim>
+                                    <p:anim calcmode="lin" valueType="num">
+                                      <p:cBhvr additive="base">
+                                        <p:cTn id="8" dur="1000" fill="hold"/>
+                                        <p:tgtEl>
+                                          <p:spTgt spid="33"/>
+                                        </p:tgtEl>
+                                        <p:attrNameLst>
+                                          <p:attrName>ppt_y</p:attrName>
+                                        </p:attrNameLst>
+                                      </p:cBhvr>
+                                      <p:tavLst>
+                                        <p:tav tm="0">
+                                          <p:val>
+                                            <p:strVal val="#ppt_y"/>
+                                          </p:val>
+                                        </p:tav>
+                                        <p:tav tm="100000">
+                                          <p:val>
+                                            <p:strVal val="#ppt_y"/>
+                                          </p:val>
+                                        </p:tav>
+                                      </p:tavLst>
+                                    </p:anim>
+                                  </p:childTnLst>
+                                </p:cTn>
+                              </p:par>
+                            </p:childTnLst>
+                          </p:cTn>
+                        </p:par>
+                        <p:par>
+                          <p:cTn id="9" fill="hold">
+                            <p:stCondLst>
+                              <p:cond delay="1000"/>
+                            </p:stCondLst>
+                            <p:childTnLst>
+                              <p:par>
+                                <p:cTn id="10" presetID="2" presetClass="entr" presetSubtype="4" fill="hold" nodeType="afterEffect">
+                                  <p:stCondLst>
+                                    <p:cond delay="0"/>
+                                  </p:stCondLst>
+                                  <p:childTnLst>
+                                    <p:set>
+                                      <p:cBhvr>
+                                        <p:cTn id="11" dur="1" fill="hold">
+                                          <p:stCondLst>
+                                            <p:cond delay="0"/>
+                                          </p:stCondLst>
+                                        </p:cTn>
+                                        <p:tgtEl>
+                                          <p:spTgt spid="34"/>
+                                        </p:tgtEl>
+                                        <p:attrNameLst>
+                                          <p:attrName>style.visibility</p:attrName>
+                                        </p:attrNameLst>
+                                      </p:cBhvr>
+                                      <p:to>
+                                        <p:strVal val="visible"/>
+                                      </p:to>
+                                    </p:set>
+                                    <p:anim calcmode="lin" valueType="num">
+                                      <p:cBhvr additive="base">
+                                        <p:cTn id="12" dur="500" fill="hold"/>
+                                        <p:tgtEl>
+                                          <p:spTgt spid="34"/>
+                                        </p:tgtEl>
+                                        <p:attrNameLst>
+                                          <p:attrName>ppt_x</p:attrName>
+                                        </p:attrNameLst>
+                                      </p:cBhvr>
+                                      <p:tavLst>
+                                        <p:tav tm="0">
+                                          <p:val>
+                                            <p:strVal val="#ppt_x"/>
+                                          </p:val>
+                                        </p:tav>
+                                        <p:tav tm="100000">
+                                          <p:val>
+                                            <p:strVal val="#ppt_x"/>
+                                          </p:val>
+                                        </p:tav>
+                                      </p:tavLst>
+                                    </p:anim>
+                                    <p:anim calcmode="lin" valueType="num">
+                                      <p:cBhvr additive="base">
+                                        <p:cTn id="13" dur="500" fill="hold"/>
+                                        <p:tgtEl>
+                                          <p:spTgt spid="34"/>
+                                        </p:tgtEl>
+                                        <p:attrNameLst>
+                                          <p:attrName>ppt_y</p:attrName>
+                                        </p:attrNameLst>
+                                      </p:cBhvr>
+                                      <p:tavLst>
+                                        <p:tav tm="0">
+                                          <p:val>
+                                            <p:strVal val="1+#ppt_h/2"/>
+                                          </p:val>
+                                        </p:tav>
+                                        <p:tav tm="100000">
+                                          <p:val>
+                                            <p:strVal val="#ppt_y"/>
+                                          </p:val>
+                                        </p:tav>
+                                      </p:tavLst>
+                                    </p:anim>
+                                  </p:childTnLst>
+                                </p:cTn>
+                              </p:par>
+                            </p:childTnLst>
+                          </p:cTn>
+                        </p:par>
+                      </p:childTnLst>
+                    </p:cTn>
+                  </p:par>
+                </p:childTnLst>
+              </p:cTn>
+              <p:prevCondLst>
+                <p:cond evt="onPrev" delay="0">
+                  <p:tgtEl>
+                    <p:sldTgt/>
+                  </p:tgtEl>
+                </p:cond>
+              </p:prevCondLst>
+              <p:nextCondLst>
+                <p:cond evt="onNext" delay="0">
+                  <p:tgtEl>
+                    <p:sldTgt/>
+                  </p:tgtEl>
+                </p:cond>
+              </p:nextCondLst>
+            </p:seq>
+          </p:childTnLst>
+        </p:cTn>
+      </p:par>
+    </p:tnLst>
+    <p:bldLst>
+      <p:bldP spid="33" grpId="0"/>
+    </p:bldLst>
+  </p:timing>
+</p:sld>
+</file>
+
+<file path=ppt/slides/slide6.xml><?xml version="1.0" encoding="utf-8"?>
+<p:sld xmlns:a="http://schemas.openxmlformats.org/drawingml/2006/main" xmlns:r="http://schemas.openxmlformats.org/officeDocument/2006/relationships" xmlns:p="http://schemas.openxmlformats.org/presentationml/2006/main">
+  <p:cSld>
+    <p:spTree>
+      <p:nvGrpSpPr>
+        <p:cNvPr id="1" name=""/>
+        <p:cNvGrpSpPr/>
+        <p:nvPr/>
+      </p:nvGrpSpPr>
+      <p:grpSpPr>
+        <a:xfrm>
+          <a:off x="0" y="0"/>
+          <a:ext cx="0" cy="0"/>
+          <a:chOff x="0" y="0"/>
+          <a:chExt cx="0" cy="0"/>
+        </a:xfrm>
+      </p:grpSpPr>
+      <p:sp>
+        <p:nvSpPr>
+          <p:cNvPr id="33" name="Marcador de texto 4"/>
+          <p:cNvSpPr txBox="1">
+            <a:spLocks/>
+          </p:cNvSpPr>
+          <p:nvPr/>
+        </p:nvSpPr>
+        <p:spPr>
+          <a:xfrm>
+            <a:off x="2246688" y="1053149"/>
+            <a:ext cx="17101901" cy="1802637"/>
+          </a:xfrm>
+          <a:prstGeom prst="rect">
+            <a:avLst/>
+          </a:prstGeom>
+        </p:spPr>
+        <p:txBody>
+          <a:bodyPr/>
+          <a:lstStyle>
+            <a:lvl1pPr marL="0" indent="0" algn="l" defTabSz="1812040" rtl="0" eaLnBrk="1" latinLnBrk="0" hangingPunct="1">
+              <a:spcBef>
+                <a:spcPct val="20000"/>
+              </a:spcBef>
+              <a:spcAft>
+                <a:spcPts val="1199"/>
+              </a:spcAft>
+              <a:buFont typeface="Arial" pitchFamily="34" charset="0"/>
+              <a:buNone/>
+              <a:defRPr sz="4000" b="1" kern="1200">
+                <a:solidFill>
+                  <a:schemeClr val="tx1"/>
+                </a:solidFill>
+                <a:latin typeface="+mn-lt"/>
+                <a:ea typeface="+mn-ea"/>
+                <a:cs typeface="+mn-cs"/>
+              </a:defRPr>
+            </a:lvl1pPr>
+            <a:lvl2pPr marL="906009" indent="-362365" algn="l" defTabSz="1812040" rtl="0" eaLnBrk="1" latinLnBrk="0" hangingPunct="1">
+              <a:spcBef>
+                <a:spcPct val="20000"/>
+              </a:spcBef>
+              <a:buClr>
+                <a:schemeClr val="tx2"/>
+              </a:buClr>
+              <a:buFont typeface="Arial" pitchFamily="34" charset="0"/>
+              <a:buChar char="•"/>
+              <a:defRPr sz="4000" kern="1200">
+                <a:solidFill>
+                  <a:schemeClr val="tx1"/>
+                </a:solidFill>
+                <a:latin typeface="+mn-lt"/>
+                <a:ea typeface="+mn-ea"/>
+                <a:cs typeface="+mn-cs"/>
+              </a:defRPr>
+            </a:lvl2pPr>
+            <a:lvl3pPr marL="2265040" indent="-453004" algn="l" defTabSz="1812040" rtl="0" eaLnBrk="1" latinLnBrk="0" hangingPunct="1">
+              <a:spcBef>
+                <a:spcPct val="20000"/>
+              </a:spcBef>
+              <a:buClr>
+                <a:schemeClr val="tx2"/>
+              </a:buClr>
+              <a:buFont typeface="Arial" pitchFamily="34" charset="0"/>
+              <a:buChar char="•"/>
+              <a:defRPr sz="3702" kern="1200">
+                <a:solidFill>
+                  <a:schemeClr val="tx1"/>
+                </a:solidFill>
+                <a:latin typeface="+mn-lt"/>
+                <a:ea typeface="+mn-ea"/>
+                <a:cs typeface="+mn-cs"/>
+              </a:defRPr>
+            </a:lvl3pPr>
+            <a:lvl4pPr marL="3171046" indent="-453004" algn="l" defTabSz="1812040" rtl="0" eaLnBrk="1" latinLnBrk="0" hangingPunct="1">
+              <a:spcBef>
+                <a:spcPct val="20000"/>
+              </a:spcBef>
+              <a:buClr>
+                <a:schemeClr val="tx2"/>
+              </a:buClr>
+              <a:buFont typeface="Arial" pitchFamily="34" charset="0"/>
+              <a:buChar char="•"/>
+              <a:defRPr sz="3702" kern="1200">
+                <a:solidFill>
+                  <a:schemeClr val="tx1"/>
+                </a:solidFill>
+                <a:latin typeface="+mn-lt"/>
+                <a:ea typeface="+mn-ea"/>
+                <a:cs typeface="+mn-cs"/>
+              </a:defRPr>
+            </a:lvl4pPr>
+            <a:lvl5pPr marL="4077068" indent="-453004" algn="l" defTabSz="1812040" rtl="0" eaLnBrk="1" latinLnBrk="0" hangingPunct="1">
+              <a:spcBef>
+                <a:spcPct val="20000"/>
+              </a:spcBef>
+              <a:buClr>
+                <a:schemeClr val="tx2"/>
+              </a:buClr>
+              <a:buFont typeface="Arial" pitchFamily="34" charset="0"/>
+              <a:buChar char="•"/>
+              <a:defRPr sz="3702" kern="1200" baseline="0">
+                <a:solidFill>
+                  <a:schemeClr val="tx1"/>
+                </a:solidFill>
+                <a:latin typeface="+mn-lt"/>
+                <a:ea typeface="+mn-ea"/>
+                <a:cs typeface="+mn-cs"/>
+              </a:defRPr>
+            </a:lvl5pPr>
+            <a:lvl6pPr marL="4983081" indent="-453004" algn="l" defTabSz="1812040" rtl="0" eaLnBrk="1" latinLnBrk="0" hangingPunct="1">
+              <a:spcBef>
+                <a:spcPct val="20000"/>
+              </a:spcBef>
+              <a:buClr>
+                <a:schemeClr val="tx2"/>
+              </a:buClr>
+              <a:buFont typeface="Arial" pitchFamily="34" charset="0"/>
+              <a:buChar char="•"/>
+              <a:defRPr sz="3200" kern="1200">
+                <a:solidFill>
+                  <a:schemeClr val="tx1"/>
+                </a:solidFill>
+                <a:latin typeface="+mn-lt"/>
+                <a:ea typeface="+mn-ea"/>
+                <a:cs typeface="+mn-cs"/>
+              </a:defRPr>
+            </a:lvl6pPr>
+            <a:lvl7pPr marL="5889088" indent="-453004" algn="l" defTabSz="1812040" rtl="0" eaLnBrk="1" latinLnBrk="0" hangingPunct="1">
+              <a:spcBef>
+                <a:spcPct val="20000"/>
+              </a:spcBef>
+              <a:buClr>
+                <a:schemeClr val="tx2"/>
+              </a:buClr>
+              <a:buFont typeface="Arial" pitchFamily="34" charset="0"/>
+              <a:buChar char="•"/>
+              <a:defRPr sz="3200" kern="1200">
+                <a:solidFill>
+                  <a:schemeClr val="tx1"/>
+                </a:solidFill>
+                <a:latin typeface="+mn-lt"/>
+                <a:ea typeface="+mn-ea"/>
+                <a:cs typeface="+mn-cs"/>
+              </a:defRPr>
+            </a:lvl7pPr>
+            <a:lvl8pPr marL="6795112" indent="-453004" algn="l" defTabSz="1812040" rtl="0" eaLnBrk="1" latinLnBrk="0" hangingPunct="1">
+              <a:spcBef>
+                <a:spcPct val="20000"/>
+              </a:spcBef>
+              <a:buClr>
+                <a:schemeClr val="tx2"/>
+              </a:buClr>
+              <a:buFont typeface="Arial" pitchFamily="34" charset="0"/>
+              <a:buChar char="•"/>
+              <a:defRPr sz="3200" kern="1200">
+                <a:solidFill>
+                  <a:schemeClr val="tx1"/>
+                </a:solidFill>
+                <a:latin typeface="+mn-lt"/>
+                <a:ea typeface="+mn-ea"/>
+                <a:cs typeface="+mn-cs"/>
+              </a:defRPr>
+            </a:lvl8pPr>
+            <a:lvl9pPr marL="7701118" indent="-453004" algn="l" defTabSz="1812040" rtl="0" eaLnBrk="1" latinLnBrk="0" hangingPunct="1">
+              <a:spcBef>
+                <a:spcPct val="20000"/>
+              </a:spcBef>
+              <a:buClr>
+                <a:schemeClr val="tx2"/>
+              </a:buClr>
+              <a:buFont typeface="Arial" pitchFamily="34" charset="0"/>
+              <a:buChar char="•"/>
+              <a:defRPr sz="3200" kern="1200">
+                <a:solidFill>
+                  <a:schemeClr val="tx1"/>
+                </a:solidFill>
+                <a:latin typeface="+mn-lt"/>
+                <a:ea typeface="+mn-ea"/>
+                <a:cs typeface="+mn-cs"/>
+              </a:defRPr>
+            </a:lvl9pPr>
+          </a:lstStyle>
+          <a:p>
+            <a:r>
+              <a:rPr lang="en-US" sz="4400" dirty="0" smtClean="0">
+                <a:solidFill>
+                  <a:schemeClr val="accent3">
+                    <a:lumMod val="75000"/>
+                  </a:schemeClr>
+                </a:solidFill>
+                <a:ea typeface="Open Sans Semibold" panose="020B0706030804020204" pitchFamily="34" charset="0"/>
+                <a:cs typeface="Open Sans Semibold" panose="020B0706030804020204" pitchFamily="34" charset="0"/>
+              </a:rPr>
+              <a:t>Recommended Tags for Documentation</a:t>
+            </a:r>
+            <a:endParaRPr lang="en-US" sz="4400" dirty="0">
+              <a:solidFill>
+                <a:schemeClr val="accent3">
+                  <a:lumMod val="75000"/>
+                </a:schemeClr>
+              </a:solidFill>
+              <a:ea typeface="Open Sans Semibold" panose="020B0706030804020204" pitchFamily="34" charset="0"/>
+              <a:cs typeface="Open Sans Semibold" panose="020B0706030804020204" pitchFamily="34" charset="0"/>
+            </a:endParaRPr>
+          </a:p>
+        </p:txBody>
+      </p:sp>
+      <p:cxnSp>
+        <p:nvCxnSpPr>
+          <p:cNvPr id="34" name="10 Conector recto"/>
+          <p:cNvCxnSpPr/>
+          <p:nvPr/>
+        </p:nvCxnSpPr>
+        <p:spPr>
+          <a:xfrm>
+            <a:off x="2246688" y="1955687"/>
+            <a:ext cx="9271031" cy="0"/>
+          </a:xfrm>
+          <a:prstGeom prst="line">
+            <a:avLst/>
+          </a:prstGeom>
+          <a:ln w="57150">
+            <a:solidFill>
+              <a:srgbClr val="C00000"/>
+            </a:solidFill>
+          </a:ln>
+        </p:spPr>
+        <p:style>
+          <a:lnRef idx="1">
+            <a:schemeClr val="accent1"/>
+          </a:lnRef>
+          <a:fillRef idx="0">
+            <a:schemeClr val="accent1"/>
+          </a:fillRef>
+          <a:effectRef idx="0">
+            <a:schemeClr val="accent1"/>
+          </a:effectRef>
+          <a:fontRef idx="minor">
+            <a:schemeClr val="tx1"/>
+          </a:fontRef>
+        </p:style>
+      </p:cxnSp>
+      <p:sp>
+        <p:nvSpPr>
+          <p:cNvPr id="35" name="TextBox 34"/>
+          <p:cNvSpPr txBox="1"/>
+          <p:nvPr/>
+        </p:nvSpPr>
+        <p:spPr>
+          <a:xfrm>
+            <a:off x="2246688" y="2855786"/>
+            <a:ext cx="19982220" cy="646331"/>
+          </a:xfrm>
+          <a:prstGeom prst="rect">
+            <a:avLst/>
+          </a:prstGeom>
+          <a:noFill/>
+        </p:spPr>
+        <p:txBody>
+          <a:bodyPr wrap="square" rtlCol="0">
+            <a:spAutoFit/>
+          </a:bodyPr>
+          <a:lstStyle/>
+          <a:p>
+            <a:pPr marL="571500" indent="-571500">
+              <a:buFont typeface="Arial" panose="020B0604020202020204" pitchFamily="34" charset="0"/>
+              <a:buChar char="•"/>
+            </a:pPr>
+            <a:r>
+              <a:rPr lang="en-US" sz="3600" dirty="0"/>
+              <a:t>The following tags provide generally used functionality in user documentation.</a:t>
+            </a:r>
+            <a:endParaRPr lang="en-US" sz="3600" dirty="0"/>
+          </a:p>
+        </p:txBody>
+      </p:sp>
+      <p:pic>
+        <p:nvPicPr>
+          <p:cNvPr id="5" name="Picture 4"/>
+          <p:cNvPicPr>
+            <a:picLocks noChangeAspect="1"/>
+          </p:cNvPicPr>
+          <p:nvPr/>
+        </p:nvPicPr>
+        <p:blipFill>
+          <a:blip r:embed="rId2"/>
+          <a:stretch>
+            <a:fillRect/>
+          </a:stretch>
+        </p:blipFill>
+        <p:spPr>
+          <a:xfrm>
+            <a:off x="2246688" y="3756951"/>
+            <a:ext cx="19982220" cy="8191019"/>
+          </a:xfrm>
+          <a:prstGeom prst="rect">
+            <a:avLst/>
+          </a:prstGeom>
+        </p:spPr>
+      </p:pic>
+    </p:spTree>
+    <p:extLst>
+      <p:ext uri="{BB962C8B-B14F-4D97-AF65-F5344CB8AC3E}">
+        <p14:creationId xmlns:p14="http://schemas.microsoft.com/office/powerpoint/2010/main" val="1217449547"/>
+      </p:ext>
+    </p:extLst>
+  </p:cSld>
+  <p:clrMapOvr>
+    <a:masterClrMapping/>
+  </p:clrMapOvr>
+  <p:timing>
+    <p:tnLst>
+      <p:par>
+        <p:cTn id="1" dur="indefinite" restart="never" nodeType="tmRoot">
+          <p:childTnLst>
+            <p:seq concurrent="1" nextAc="seek">
+              <p:cTn id="2" dur="indefinite" nodeType="mainSeq">
+                <p:childTnLst>
+                  <p:par>
+                    <p:cTn id="3" fill="hold">
+                      <p:stCondLst>
+                        <p:cond delay="indefinite"/>
+                        <p:cond evt="onBegin" delay="0">
+                          <p:tn val="2"/>
+                        </p:cond>
+                      </p:stCondLst>
+                      <p:childTnLst>
+                        <p:par>
+                          <p:cTn id="4" fill="hold">
+                            <p:stCondLst>
+                              <p:cond delay="0"/>
+                            </p:stCondLst>
+                            <p:childTnLst>
+                              <p:par>
+                                <p:cTn id="5" presetID="2" presetClass="entr" presetSubtype="8" decel="100000" fill="hold" grpId="0" nodeType="withEffect">
+                                  <p:stCondLst>
+                                    <p:cond delay="0"/>
+                                  </p:stCondLst>
+                                  <p:childTnLst>
+                                    <p:set>
+                                      <p:cBhvr>
+                                        <p:cTn id="6" dur="1" fill="hold">
+                                          <p:stCondLst>
+                                            <p:cond delay="0"/>
+                                          </p:stCondLst>
+                                        </p:cTn>
+                                        <p:tgtEl>
+                                          <p:spTgt spid="33"/>
+                                        </p:tgtEl>
+                                        <p:attrNameLst>
+                                          <p:attrName>style.visibility</p:attrName>
+                                        </p:attrNameLst>
+                                      </p:cBhvr>
+                                      <p:to>
+                                        <p:strVal val="visible"/>
+                                      </p:to>
+                                    </p:set>
+                                    <p:anim calcmode="lin" valueType="num">
+                                      <p:cBhvr additive="base">
+                                        <p:cTn id="7" dur="1000" fill="hold"/>
+                                        <p:tgtEl>
+                                          <p:spTgt spid="33"/>
+                                        </p:tgtEl>
+                                        <p:attrNameLst>
+                                          <p:attrName>ppt_x</p:attrName>
+                                        </p:attrNameLst>
+                                      </p:cBhvr>
+                                      <p:tavLst>
+                                        <p:tav tm="0">
+                                          <p:val>
+                                            <p:strVal val="0-#ppt_w/2"/>
+                                          </p:val>
+                                        </p:tav>
+                                        <p:tav tm="100000">
+                                          <p:val>
+                                            <p:strVal val="#ppt_x"/>
+                                          </p:val>
+                                        </p:tav>
+                                      </p:tavLst>
+                                    </p:anim>
+                                    <p:anim calcmode="lin" valueType="num">
+                                      <p:cBhvr additive="base">
+                                        <p:cTn id="8" dur="1000" fill="hold"/>
+                                        <p:tgtEl>
+                                          <p:spTgt spid="33"/>
+                                        </p:tgtEl>
+                                        <p:attrNameLst>
+                                          <p:attrName>ppt_y</p:attrName>
+                                        </p:attrNameLst>
+                                      </p:cBhvr>
+                                      <p:tavLst>
+                                        <p:tav tm="0">
+                                          <p:val>
+                                            <p:strVal val="#ppt_y"/>
+                                          </p:val>
+                                        </p:tav>
+                                        <p:tav tm="100000">
+                                          <p:val>
+                                            <p:strVal val="#ppt_y"/>
+                                          </p:val>
+                                        </p:tav>
+                                      </p:tavLst>
+                                    </p:anim>
+                                  </p:childTnLst>
+                                </p:cTn>
+                              </p:par>
+                            </p:childTnLst>
+                          </p:cTn>
+                        </p:par>
+                        <p:par>
+                          <p:cTn id="9" fill="hold">
+                            <p:stCondLst>
+                              <p:cond delay="1000"/>
+                            </p:stCondLst>
+                            <p:childTnLst>
+                              <p:par>
+                                <p:cTn id="10" presetID="2" presetClass="entr" presetSubtype="4" fill="hold" nodeType="afterEffect">
+                                  <p:stCondLst>
+                                    <p:cond delay="0"/>
+                                  </p:stCondLst>
+                                  <p:childTnLst>
+                                    <p:set>
+                                      <p:cBhvr>
+                                        <p:cTn id="11" dur="1" fill="hold">
+                                          <p:stCondLst>
+                                            <p:cond delay="0"/>
+                                          </p:stCondLst>
+                                        </p:cTn>
+                                        <p:tgtEl>
+                                          <p:spTgt spid="34"/>
+                                        </p:tgtEl>
+                                        <p:attrNameLst>
+                                          <p:attrName>style.visibility</p:attrName>
+                                        </p:attrNameLst>
+                                      </p:cBhvr>
+                                      <p:to>
+                                        <p:strVal val="visible"/>
+                                      </p:to>
+                                    </p:set>
+                                    <p:anim calcmode="lin" valueType="num">
+                                      <p:cBhvr additive="base">
+                                        <p:cTn id="12" dur="500" fill="hold"/>
+                                        <p:tgtEl>
+                                          <p:spTgt spid="34"/>
+                                        </p:tgtEl>
+                                        <p:attrNameLst>
+                                          <p:attrName>ppt_x</p:attrName>
+                                        </p:attrNameLst>
+                                      </p:cBhvr>
+                                      <p:tavLst>
+                                        <p:tav tm="0">
+                                          <p:val>
+                                            <p:strVal val="#ppt_x"/>
+                                          </p:val>
+                                        </p:tav>
+                                        <p:tav tm="100000">
+                                          <p:val>
+                                            <p:strVal val="#ppt_x"/>
+                                          </p:val>
+                                        </p:tav>
+                                      </p:tavLst>
+                                    </p:anim>
+                                    <p:anim calcmode="lin" valueType="num">
+                                      <p:cBhvr additive="base">
+                                        <p:cTn id="13" dur="500" fill="hold"/>
+                                        <p:tgtEl>
+                                          <p:spTgt spid="34"/>
+                                        </p:tgtEl>
+                                        <p:attrNameLst>
+                                          <p:attrName>ppt_y</p:attrName>
+                                        </p:attrNameLst>
+                                      </p:cBhvr>
+                                      <p:tavLst>
+                                        <p:tav tm="0">
+                                          <p:val>
+                                            <p:strVal val="1+#ppt_h/2"/>
+                                          </p:val>
+                                        </p:tav>
+                                        <p:tav tm="100000">
+                                          <p:val>
+                                            <p:strVal val="#ppt_y"/>
+                                          </p:val>
+                                        </p:tav>
+                                      </p:tavLst>
+                                    </p:anim>
+                                  </p:childTnLst>
+                                </p:cTn>
+                              </p:par>
+                            </p:childTnLst>
+                          </p:cTn>
+                        </p:par>
+                      </p:childTnLst>
+                    </p:cTn>
+                  </p:par>
+                </p:childTnLst>
+              </p:cTn>
+              <p:prevCondLst>
+                <p:cond evt="onPrev" delay="0">
+                  <p:tgtEl>
+                    <p:sldTgt/>
+                  </p:tgtEl>
+                </p:cond>
+              </p:prevCondLst>
+              <p:nextCondLst>
+                <p:cond evt="onNext" delay="0">
+                  <p:tgtEl>
+                    <p:sldTgt/>
+                  </p:tgtEl>
+                </p:cond>
+              </p:nextCondLst>
+            </p:seq>
+          </p:childTnLst>
+        </p:cTn>
+      </p:par>
+    </p:tnLst>
+    <p:bldLst>
+      <p:bldP spid="33" grpId="0"/>
+    </p:bldLst>
+  </p:timing>
+</p:sld>
+</file>
+
+<file path=ppt/slides/slide7.xml><?xml version="1.0" encoding="utf-8"?>
+<p:sld xmlns:a="http://schemas.openxmlformats.org/drawingml/2006/main" xmlns:r="http://schemas.openxmlformats.org/officeDocument/2006/relationships" xmlns:p="http://schemas.openxmlformats.org/presentationml/2006/main">
+  <p:cSld>
+    <p:spTree>
+      <p:nvGrpSpPr>
+        <p:cNvPr id="1" name=""/>
+        <p:cNvGrpSpPr/>
+        <p:nvPr/>
+      </p:nvGrpSpPr>
+      <p:grpSpPr>
+        <a:xfrm>
+          <a:off x="0" y="0"/>
+          <a:ext cx="0" cy="0"/>
+          <a:chOff x="0" y="0"/>
+          <a:chExt cx="0" cy="0"/>
+        </a:xfrm>
+      </p:grpSpPr>
+      <p:sp>
+        <p:nvSpPr>
+          <p:cNvPr id="2" name="Marcador de texto 4"/>
+          <p:cNvSpPr txBox="1">
+            <a:spLocks/>
+          </p:cNvSpPr>
+          <p:nvPr/>
+        </p:nvSpPr>
+        <p:spPr>
+          <a:xfrm>
+            <a:off x="1886648" y="1053149"/>
+            <a:ext cx="17101901" cy="1802637"/>
+          </a:xfrm>
+          <a:prstGeom prst="rect">
+            <a:avLst/>
+          </a:prstGeom>
+        </p:spPr>
+        <p:txBody>
+          <a:bodyPr/>
+          <a:lstStyle>
+            <a:lvl1pPr marL="0" indent="0" algn="l" defTabSz="1812040" rtl="0" eaLnBrk="1" latinLnBrk="0" hangingPunct="1">
+              <a:spcBef>
+                <a:spcPct val="20000"/>
+              </a:spcBef>
+              <a:spcAft>
+                <a:spcPts val="1199"/>
+              </a:spcAft>
+              <a:buFont typeface="Arial" pitchFamily="34" charset="0"/>
+              <a:buNone/>
+              <a:defRPr sz="4000" b="1" kern="1200">
+                <a:solidFill>
+                  <a:schemeClr val="tx1"/>
+                </a:solidFill>
+                <a:latin typeface="+mn-lt"/>
+                <a:ea typeface="+mn-ea"/>
+                <a:cs typeface="+mn-cs"/>
+              </a:defRPr>
+            </a:lvl1pPr>
+            <a:lvl2pPr marL="906009" indent="-362365" algn="l" defTabSz="1812040" rtl="0" eaLnBrk="1" latinLnBrk="0" hangingPunct="1">
+              <a:spcBef>
+                <a:spcPct val="20000"/>
+              </a:spcBef>
+              <a:buClr>
+                <a:schemeClr val="tx2"/>
+              </a:buClr>
+              <a:buFont typeface="Arial" pitchFamily="34" charset="0"/>
+              <a:buChar char="•"/>
+              <a:defRPr sz="4000" kern="1200">
+                <a:solidFill>
+                  <a:schemeClr val="tx1"/>
+                </a:solidFill>
+                <a:latin typeface="+mn-lt"/>
+                <a:ea typeface="+mn-ea"/>
+                <a:cs typeface="+mn-cs"/>
+              </a:defRPr>
+            </a:lvl2pPr>
+            <a:lvl3pPr marL="2265040" indent="-453004" algn="l" defTabSz="1812040" rtl="0" eaLnBrk="1" latinLnBrk="0" hangingPunct="1">
+              <a:spcBef>
+                <a:spcPct val="20000"/>
+              </a:spcBef>
+              <a:buClr>
+                <a:schemeClr val="tx2"/>
+              </a:buClr>
+              <a:buFont typeface="Arial" pitchFamily="34" charset="0"/>
+              <a:buChar char="•"/>
+              <a:defRPr sz="3702" kern="1200">
+                <a:solidFill>
+                  <a:schemeClr val="tx1"/>
+                </a:solidFill>
+                <a:latin typeface="+mn-lt"/>
+                <a:ea typeface="+mn-ea"/>
+                <a:cs typeface="+mn-cs"/>
+              </a:defRPr>
+            </a:lvl3pPr>
+            <a:lvl4pPr marL="3171046" indent="-453004" algn="l" defTabSz="1812040" rtl="0" eaLnBrk="1" latinLnBrk="0" hangingPunct="1">
+              <a:spcBef>
+                <a:spcPct val="20000"/>
+              </a:spcBef>
+              <a:buClr>
+                <a:schemeClr val="tx2"/>
+              </a:buClr>
+              <a:buFont typeface="Arial" pitchFamily="34" charset="0"/>
+              <a:buChar char="•"/>
+              <a:defRPr sz="3702" kern="1200">
+                <a:solidFill>
+                  <a:schemeClr val="tx1"/>
+                </a:solidFill>
+                <a:latin typeface="+mn-lt"/>
+                <a:ea typeface="+mn-ea"/>
+                <a:cs typeface="+mn-cs"/>
+              </a:defRPr>
+            </a:lvl4pPr>
+            <a:lvl5pPr marL="4077068" indent="-453004" algn="l" defTabSz="1812040" rtl="0" eaLnBrk="1" latinLnBrk="0" hangingPunct="1">
+              <a:spcBef>
+                <a:spcPct val="20000"/>
+              </a:spcBef>
+              <a:buClr>
+                <a:schemeClr val="tx2"/>
+              </a:buClr>
+              <a:buFont typeface="Arial" pitchFamily="34" charset="0"/>
+              <a:buChar char="•"/>
+              <a:defRPr sz="3702" kern="1200" baseline="0">
+                <a:solidFill>
+                  <a:schemeClr val="tx1"/>
+                </a:solidFill>
+                <a:latin typeface="+mn-lt"/>
+                <a:ea typeface="+mn-ea"/>
+                <a:cs typeface="+mn-cs"/>
+              </a:defRPr>
+            </a:lvl5pPr>
+            <a:lvl6pPr marL="4983081" indent="-453004" algn="l" defTabSz="1812040" rtl="0" eaLnBrk="1" latinLnBrk="0" hangingPunct="1">
+              <a:spcBef>
+                <a:spcPct val="20000"/>
+              </a:spcBef>
+              <a:buClr>
+                <a:schemeClr val="tx2"/>
+              </a:buClr>
+              <a:buFont typeface="Arial" pitchFamily="34" charset="0"/>
+              <a:buChar char="•"/>
+              <a:defRPr sz="3200" kern="1200">
+                <a:solidFill>
+                  <a:schemeClr val="tx1"/>
+                </a:solidFill>
+                <a:latin typeface="+mn-lt"/>
+                <a:ea typeface="+mn-ea"/>
+                <a:cs typeface="+mn-cs"/>
+              </a:defRPr>
+            </a:lvl6pPr>
+            <a:lvl7pPr marL="5889088" indent="-453004" algn="l" defTabSz="1812040" rtl="0" eaLnBrk="1" latinLnBrk="0" hangingPunct="1">
+              <a:spcBef>
+                <a:spcPct val="20000"/>
+              </a:spcBef>
+              <a:buClr>
+                <a:schemeClr val="tx2"/>
+              </a:buClr>
+              <a:buFont typeface="Arial" pitchFamily="34" charset="0"/>
+              <a:buChar char="•"/>
+              <a:defRPr sz="3200" kern="1200">
+                <a:solidFill>
+                  <a:schemeClr val="tx1"/>
+                </a:solidFill>
+                <a:latin typeface="+mn-lt"/>
+                <a:ea typeface="+mn-ea"/>
+                <a:cs typeface="+mn-cs"/>
+              </a:defRPr>
+            </a:lvl7pPr>
+            <a:lvl8pPr marL="6795112" indent="-453004" algn="l" defTabSz="1812040" rtl="0" eaLnBrk="1" latinLnBrk="0" hangingPunct="1">
+              <a:spcBef>
+                <a:spcPct val="20000"/>
+              </a:spcBef>
+              <a:buClr>
+                <a:schemeClr val="tx2"/>
+              </a:buClr>
+              <a:buFont typeface="Arial" pitchFamily="34" charset="0"/>
+              <a:buChar char="•"/>
+              <a:defRPr sz="3200" kern="1200">
+                <a:solidFill>
+                  <a:schemeClr val="tx1"/>
+                </a:solidFill>
+                <a:latin typeface="+mn-lt"/>
+                <a:ea typeface="+mn-ea"/>
+                <a:cs typeface="+mn-cs"/>
+              </a:defRPr>
+            </a:lvl8pPr>
+            <a:lvl9pPr marL="7701118" indent="-453004" algn="l" defTabSz="1812040" rtl="0" eaLnBrk="1" latinLnBrk="0" hangingPunct="1">
+              <a:spcBef>
+                <a:spcPct val="20000"/>
+              </a:spcBef>
+              <a:buClr>
+                <a:schemeClr val="tx2"/>
+              </a:buClr>
+              <a:buFont typeface="Arial" pitchFamily="34" charset="0"/>
+              <a:buChar char="•"/>
+              <a:defRPr sz="3200" kern="1200">
+                <a:solidFill>
+                  <a:schemeClr val="tx1"/>
+                </a:solidFill>
+                <a:latin typeface="+mn-lt"/>
+                <a:ea typeface="+mn-ea"/>
+                <a:cs typeface="+mn-cs"/>
+              </a:defRPr>
+            </a:lvl9pPr>
+          </a:lstStyle>
+          <a:p>
+            <a:r>
+              <a:rPr lang="en-US" sz="6600" dirty="0" smtClean="0">
+                <a:solidFill>
+                  <a:schemeClr val="accent3">
+                    <a:lumMod val="75000"/>
+                  </a:schemeClr>
+                </a:solidFill>
+                <a:ea typeface="Open Sans Semibold" panose="020B0706030804020204" pitchFamily="34" charset="0"/>
+                <a:cs typeface="Open Sans Semibold" panose="020B0706030804020204" pitchFamily="34" charset="0"/>
+              </a:rPr>
+              <a:t>Example: C# </a:t>
+            </a:r>
+            <a:r>
+              <a:rPr lang="en-US" sz="6600" dirty="0" smtClean="0">
+                <a:solidFill>
+                  <a:schemeClr val="accent3">
+                    <a:lumMod val="75000"/>
+                  </a:schemeClr>
+                </a:solidFill>
+                <a:ea typeface="Open Sans Semibold" panose="020B0706030804020204" pitchFamily="34" charset="0"/>
+                <a:cs typeface="Open Sans Semibold" panose="020B0706030804020204" pitchFamily="34" charset="0"/>
+              </a:rPr>
+              <a:t>Namespaces</a:t>
+            </a:r>
+            <a:endParaRPr lang="en-US" sz="6600" dirty="0">
+              <a:solidFill>
+                <a:schemeClr val="accent3">
+                  <a:lumMod val="75000"/>
+                </a:schemeClr>
+              </a:solidFill>
+              <a:ea typeface="Open Sans Semibold" panose="020B0706030804020204" pitchFamily="34" charset="0"/>
+              <a:cs typeface="Open Sans Semibold" panose="020B0706030804020204" pitchFamily="34" charset="0"/>
+            </a:endParaRPr>
+          </a:p>
+        </p:txBody>
+      </p:sp>
+      <p:sp>
+        <p:nvSpPr>
+          <p:cNvPr id="3" name="TextBox 2"/>
+          <p:cNvSpPr txBox="1"/>
+          <p:nvPr/>
+        </p:nvSpPr>
+        <p:spPr>
+          <a:xfrm>
+            <a:off x="2201683" y="3573429"/>
+            <a:ext cx="18677075" cy="1754326"/>
+          </a:xfrm>
+          <a:prstGeom prst="rect">
+            <a:avLst/>
+          </a:prstGeom>
+          <a:noFill/>
+        </p:spPr>
+        <p:txBody>
+          <a:bodyPr wrap="square" rtlCol="0">
+            <a:spAutoFit/>
+          </a:bodyPr>
+          <a:lstStyle/>
+          <a:p>
+            <a:pPr marL="571500" indent="-571500">
+              <a:buFont typeface="Arial" panose="020B0604020202020204" pitchFamily="34" charset="0"/>
+              <a:buChar char="•"/>
+            </a:pPr>
+            <a:r>
+              <a:rPr lang="en-US" sz="3600" dirty="0" smtClean="0"/>
+              <a:t>See </a:t>
+            </a:r>
+            <a:r>
+              <a:rPr lang="en-US" sz="3600" dirty="0"/>
+              <a:t>OOPC-Chapter5 (</a:t>
+            </a:r>
+            <a:r>
+              <a:rPr lang="en-US" sz="3600" dirty="0" err="1"/>
+              <a:t>DocumentationComments.cs</a:t>
+            </a:r>
+            <a:r>
+              <a:rPr lang="en-US" sz="3600" dirty="0" smtClean="0"/>
+              <a:t>) </a:t>
+            </a:r>
+            <a:r>
+              <a:rPr lang="en-US" sz="3600" dirty="0"/>
+              <a:t>at </a:t>
+            </a:r>
+            <a:r>
+              <a:rPr lang="en-US" sz="3600" dirty="0">
+                <a:hlinkClick r:id="rId3"/>
+              </a:rPr>
+              <a:t>https://</a:t>
+            </a:r>
+            <a:r>
+              <a:rPr lang="en-US" sz="3600" dirty="0" smtClean="0">
+                <a:hlinkClick r:id="rId3"/>
+              </a:rPr>
+              <a:t>github.com/DotNetTraining/DotNetEssentials/tree/master/Code/OOPC/OOPC-Chapter5</a:t>
+            </a:r>
+            <a:r>
+              <a:rPr lang="en-US" sz="3600" dirty="0" smtClean="0"/>
+              <a:t> </a:t>
+            </a:r>
+            <a:endParaRPr lang="en-US" sz="3600" dirty="0" smtClean="0"/>
+          </a:p>
+          <a:p>
+            <a:pPr marL="571500" indent="-571500">
+              <a:buFont typeface="Arial" panose="020B0604020202020204" pitchFamily="34" charset="0"/>
+              <a:buChar char="•"/>
+            </a:pPr>
+            <a:endParaRPr lang="en-US" sz="3600" dirty="0" smtClean="0"/>
+          </a:p>
+        </p:txBody>
+      </p:sp>
+      <p:cxnSp>
+        <p:nvCxnSpPr>
+          <p:cNvPr id="4" name="10 Conector recto"/>
+          <p:cNvCxnSpPr/>
+          <p:nvPr/>
+        </p:nvCxnSpPr>
+        <p:spPr>
+          <a:xfrm flipV="1">
+            <a:off x="1886648" y="2223279"/>
+            <a:ext cx="8907678" cy="7"/>
+          </a:xfrm>
+          <a:prstGeom prst="line">
+            <a:avLst/>
+          </a:prstGeom>
+          <a:ln w="57150">
+            <a:solidFill>
+              <a:srgbClr val="C00000"/>
+            </a:solidFill>
+          </a:ln>
+        </p:spPr>
+        <p:style>
+          <a:lnRef idx="1">
+            <a:schemeClr val="accent1"/>
+          </a:lnRef>
+          <a:fillRef idx="0">
+            <a:schemeClr val="accent1"/>
+          </a:fillRef>
+          <a:effectRef idx="0">
+            <a:schemeClr val="accent1"/>
+          </a:effectRef>
+          <a:fontRef idx="minor">
+            <a:schemeClr val="tx1"/>
+          </a:fontRef>
+        </p:style>
+      </p:cxnSp>
+      <p:grpSp>
+        <p:nvGrpSpPr>
+          <p:cNvPr id="37" name="Group 36"/>
+          <p:cNvGrpSpPr/>
+          <p:nvPr/>
+        </p:nvGrpSpPr>
+        <p:grpSpPr>
+          <a:xfrm>
+            <a:off x="8264930" y="5778674"/>
+            <a:ext cx="6550580" cy="5741861"/>
+            <a:chOff x="9222464" y="6003699"/>
+            <a:chExt cx="6550580" cy="5741861"/>
+          </a:xfrm>
+        </p:grpSpPr>
+        <p:sp>
+          <p:nvSpPr>
+            <p:cNvPr id="24" name="Elipse 24"/>
+            <p:cNvSpPr/>
+            <p:nvPr/>
+          </p:nvSpPr>
+          <p:spPr bwMode="auto">
+            <a:xfrm>
+              <a:off x="11496345" y="8282658"/>
+              <a:ext cx="847214" cy="848960"/>
+            </a:xfrm>
+            <a:prstGeom prst="ellipse">
+              <a:avLst/>
+            </a:prstGeom>
+            <a:solidFill>
+              <a:srgbClr val="F44D53"/>
+            </a:solidFill>
+            <a:ln>
+              <a:noFill/>
+            </a:ln>
+            <a:extLst/>
+          </p:spPr>
+          <p:txBody>
+            <a:bodyPr lIns="0" tIns="0" rIns="0" bIns="0" rtlCol="0" anchor="ctr"/>
+            <a:lstStyle/>
+            <a:p>
+              <a:pPr algn="ctr"/>
+              <a:endParaRPr lang="es-ES"/>
+            </a:p>
+          </p:txBody>
+        </p:sp>
+        <p:sp>
+          <p:nvSpPr>
+            <p:cNvPr id="25" name="Anillo 25"/>
+            <p:cNvSpPr/>
+            <p:nvPr/>
+          </p:nvSpPr>
+          <p:spPr bwMode="auto">
+            <a:xfrm>
+              <a:off x="10384375" y="7168397"/>
+              <a:ext cx="3071154" cy="3077482"/>
+            </a:xfrm>
+            <a:prstGeom prst="donut">
+              <a:avLst>
+                <a:gd name="adj" fmla="val 13529"/>
+              </a:avLst>
+            </a:prstGeom>
+            <a:solidFill>
+              <a:srgbClr val="AAB5BD"/>
+            </a:solidFill>
+            <a:ln>
+              <a:noFill/>
+            </a:ln>
+            <a:extLst/>
+          </p:spPr>
+          <p:txBody>
+            <a:bodyPr lIns="0" tIns="0" rIns="0" bIns="0" rtlCol="0" anchor="ctr"/>
+            <a:lstStyle/>
+            <a:p>
+              <a:pPr algn="ctr"/>
+              <a:endParaRPr lang="es-ES"/>
+            </a:p>
+          </p:txBody>
+        </p:sp>
+        <p:sp>
+          <p:nvSpPr>
+            <p:cNvPr id="26" name="Anillo 26"/>
+            <p:cNvSpPr/>
+            <p:nvPr/>
+          </p:nvSpPr>
+          <p:spPr bwMode="auto">
+            <a:xfrm>
+              <a:off x="9222464" y="6003699"/>
+              <a:ext cx="5394976" cy="5406879"/>
+            </a:xfrm>
+            <a:prstGeom prst="donut">
+              <a:avLst>
+                <a:gd name="adj" fmla="val 7951"/>
+              </a:avLst>
+            </a:prstGeom>
+            <a:solidFill>
+              <a:srgbClr val="34495E"/>
+            </a:solidFill>
+            <a:ln>
+              <a:noFill/>
+            </a:ln>
+            <a:extLst/>
+          </p:spPr>
+          <p:txBody>
+            <a:bodyPr lIns="0" tIns="0" rIns="0" bIns="0" rtlCol="0" anchor="ctr"/>
+            <a:lstStyle/>
+            <a:p>
+              <a:pPr algn="ctr"/>
+              <a:endParaRPr lang="es-ES"/>
+            </a:p>
+          </p:txBody>
+        </p:sp>
+        <p:grpSp>
+          <p:nvGrpSpPr>
+            <p:cNvPr id="27" name="6 Grupo"/>
+            <p:cNvGrpSpPr/>
+            <p:nvPr/>
+          </p:nvGrpSpPr>
+          <p:grpSpPr>
+            <a:xfrm>
+              <a:off x="11304165" y="7009649"/>
+              <a:ext cx="4468879" cy="4735911"/>
+              <a:chOff x="11304165" y="7543430"/>
+              <a:chExt cx="4468879" cy="4735911"/>
+            </a:xfrm>
+          </p:grpSpPr>
+          <p:grpSp>
+            <p:nvGrpSpPr>
+              <p:cNvPr id="28" name="Grupo 22"/>
+              <p:cNvGrpSpPr/>
+              <p:nvPr/>
+            </p:nvGrpSpPr>
+            <p:grpSpPr>
+              <a:xfrm rot="19018150">
+                <a:off x="11304165" y="7543430"/>
+                <a:ext cx="4468879" cy="449612"/>
+                <a:chOff x="12782936" y="6138159"/>
+                <a:chExt cx="4925957" cy="495602"/>
+              </a:xfrm>
+            </p:grpSpPr>
+            <p:sp>
+              <p:nvSpPr>
+                <p:cNvPr id="30" name="Rectángulo redondeado 14"/>
+                <p:cNvSpPr/>
+                <p:nvPr/>
+              </p:nvSpPr>
+              <p:spPr bwMode="auto">
+                <a:xfrm rot="16200000">
+                  <a:off x="17119857" y="6044704"/>
+                  <a:ext cx="495582" cy="682491"/>
+                </a:xfrm>
+                <a:prstGeom prst="roundRect">
+                  <a:avLst>
+                    <a:gd name="adj" fmla="val 50000"/>
+                  </a:avLst>
+                </a:prstGeom>
+                <a:solidFill>
+                  <a:srgbClr val="E8685F"/>
+                </a:solidFill>
+                <a:ln>
+                  <a:noFill/>
+                </a:ln>
+                <a:extLst/>
+              </p:spPr>
+              <p:txBody>
+                <a:bodyPr lIns="0" tIns="0" rIns="0" bIns="0" rtlCol="0" anchor="ctr"/>
+                <a:lstStyle/>
+                <a:p>
+                  <a:pPr algn="ctr"/>
+                  <a:endParaRPr lang="es-ES"/>
+                </a:p>
+              </p:txBody>
+            </p:sp>
+            <p:sp>
+              <p:nvSpPr>
+                <p:cNvPr id="31" name="Rectángulo 15"/>
+                <p:cNvSpPr/>
+                <p:nvPr/>
+              </p:nvSpPr>
+              <p:spPr bwMode="auto">
+                <a:xfrm>
+                  <a:off x="13629872" y="6138686"/>
+                  <a:ext cx="3329765" cy="495053"/>
+                </a:xfrm>
+                <a:prstGeom prst="rect">
+                  <a:avLst/>
+                </a:prstGeom>
+                <a:solidFill>
+                  <a:srgbClr val="FEC830"/>
+                </a:solidFill>
+                <a:ln>
+                  <a:noFill/>
+                </a:ln>
+                <a:extLst/>
+              </p:spPr>
+              <p:txBody>
+                <a:bodyPr lIns="0" tIns="0" rIns="0" bIns="0" rtlCol="0" anchor="ctr"/>
+                <a:lstStyle/>
+                <a:p>
+                  <a:pPr algn="ctr"/>
+                  <a:endParaRPr lang="es-ES"/>
+                </a:p>
+              </p:txBody>
+            </p:sp>
+            <p:sp>
+              <p:nvSpPr>
+                <p:cNvPr id="32" name="Rectángulo 16"/>
+                <p:cNvSpPr/>
+                <p:nvPr/>
+              </p:nvSpPr>
+              <p:spPr bwMode="auto">
+                <a:xfrm>
+                  <a:off x="16959638" y="6138687"/>
+                  <a:ext cx="344209" cy="495053"/>
+                </a:xfrm>
+                <a:prstGeom prst="rect">
+                  <a:avLst/>
+                </a:prstGeom>
+                <a:gradFill>
+                  <a:gsLst>
+                    <a:gs pos="0">
+                      <a:schemeClr val="bg1">
+                        <a:lumMod val="50000"/>
+                      </a:schemeClr>
+                    </a:gs>
+                    <a:gs pos="13000">
+                      <a:srgbClr val="5F5F5F"/>
+                    </a:gs>
+                    <a:gs pos="23000">
+                      <a:srgbClr val="FFFFFF"/>
+                    </a:gs>
+                    <a:gs pos="93000">
+                      <a:srgbClr val="777777"/>
+                    </a:gs>
+                    <a:gs pos="100000">
+                      <a:srgbClr val="EAEAEA"/>
+                    </a:gs>
+                  </a:gsLst>
+                  <a:lin ang="5400000" scaled="0"/>
+                </a:gradFill>
+                <a:ln>
+                  <a:noFill/>
+                </a:ln>
+                <a:extLst/>
+              </p:spPr>
+              <p:txBody>
+                <a:bodyPr lIns="0" tIns="0" rIns="0" bIns="0" rtlCol="0" anchor="ctr"/>
+                <a:lstStyle/>
+                <a:p>
+                  <a:pPr algn="ctr"/>
+                  <a:endParaRPr lang="es-ES"/>
+                </a:p>
+              </p:txBody>
+            </p:sp>
+            <p:sp>
+              <p:nvSpPr>
+                <p:cNvPr id="33" name="Triángulo isósceles 17"/>
+                <p:cNvSpPr/>
+                <p:nvPr/>
+              </p:nvSpPr>
+              <p:spPr bwMode="auto">
+                <a:xfrm rot="16200000">
+                  <a:off x="12958614" y="5962492"/>
+                  <a:ext cx="495581" cy="846938"/>
+                </a:xfrm>
+                <a:prstGeom prst="triangle">
+                  <a:avLst>
+                    <a:gd name="adj" fmla="val 50481"/>
+                  </a:avLst>
+                </a:prstGeom>
+                <a:solidFill>
+                  <a:srgbClr val="E6EAEE"/>
+                </a:solidFill>
+                <a:ln>
+                  <a:noFill/>
+                </a:ln>
+                <a:extLst/>
+              </p:spPr>
+              <p:txBody>
+                <a:bodyPr lIns="0" tIns="0" rIns="0" bIns="0" rtlCol="0" anchor="ctr"/>
+                <a:lstStyle/>
+                <a:p>
+                  <a:pPr algn="ctr"/>
+                  <a:endParaRPr lang="es-ES"/>
+                </a:p>
+              </p:txBody>
+            </p:sp>
+            <p:sp>
+              <p:nvSpPr>
+                <p:cNvPr id="34" name="Rectángulo 19"/>
+                <p:cNvSpPr/>
+                <p:nvPr/>
+              </p:nvSpPr>
+              <p:spPr bwMode="auto">
+                <a:xfrm>
+                  <a:off x="13629876" y="6496754"/>
+                  <a:ext cx="3329764" cy="136997"/>
+                </a:xfrm>
+                <a:prstGeom prst="rect">
+                  <a:avLst/>
+                </a:prstGeom>
+                <a:solidFill>
+                  <a:srgbClr val="FFFFFF">
+                    <a:alpha val="50000"/>
+                  </a:srgbClr>
+                </a:solidFill>
+                <a:ln>
+                  <a:noFill/>
+                </a:ln>
+                <a:extLst/>
+              </p:spPr>
+              <p:txBody>
+                <a:bodyPr lIns="0" tIns="0" rIns="0" bIns="0" rtlCol="0" anchor="ctr"/>
+                <a:lstStyle/>
+                <a:p>
+                  <a:pPr algn="ctr"/>
+                  <a:endParaRPr lang="es-ES"/>
+                </a:p>
+              </p:txBody>
+            </p:sp>
+            <p:sp>
+              <p:nvSpPr>
+                <p:cNvPr id="35" name="Forma libre 20"/>
+                <p:cNvSpPr/>
+                <p:nvPr/>
+              </p:nvSpPr>
+              <p:spPr bwMode="auto">
+                <a:xfrm rot="16200000">
+                  <a:off x="12958621" y="5962502"/>
+                  <a:ext cx="495581" cy="846938"/>
+                </a:xfrm>
+                <a:custGeom>
+                  <a:avLst/>
+                  <a:gdLst>
+                    <a:gd name="connsiteX0" fmla="*/ 495582 w 495582"/>
+                    <a:gd name="connsiteY0" fmla="*/ 846940 h 846940"/>
+                    <a:gd name="connsiteX1" fmla="*/ 0 w 495582"/>
+                    <a:gd name="connsiteY1" fmla="*/ 846940 h 846940"/>
+                    <a:gd name="connsiteX2" fmla="*/ 1 w 495582"/>
+                    <a:gd name="connsiteY2" fmla="*/ 846939 h 846940"/>
+                    <a:gd name="connsiteX3" fmla="*/ 409807 w 495582"/>
+                    <a:gd name="connsiteY3" fmla="*/ 846939 h 846940"/>
+                    <a:gd name="connsiteX4" fmla="*/ 216735 w 495582"/>
+                    <a:gd name="connsiteY4" fmla="*/ 113206 h 846940"/>
+                    <a:gd name="connsiteX5" fmla="*/ 250175 w 495582"/>
+                    <a:gd name="connsiteY5" fmla="*/ 0 h 846940"/>
+                  </a:gdLst>
+                  <a:ahLst/>
+                  <a:cxnLst>
+                    <a:cxn ang="0">
+                      <a:pos x="connsiteX0" y="connsiteY0"/>
+                    </a:cxn>
+                    <a:cxn ang="0">
+                      <a:pos x="connsiteX1" y="connsiteY1"/>
+                    </a:cxn>
+                    <a:cxn ang="0">
+                      <a:pos x="connsiteX2" y="connsiteY2"/>
+                    </a:cxn>
+                    <a:cxn ang="0">
+                      <a:pos x="connsiteX3" y="connsiteY3"/>
+                    </a:cxn>
+                    <a:cxn ang="0">
+                      <a:pos x="connsiteX4" y="connsiteY4"/>
+                    </a:cxn>
+                    <a:cxn ang="0">
+                      <a:pos x="connsiteX5" y="connsiteY5"/>
+                    </a:cxn>
+                  </a:cxnLst>
+                  <a:rect l="l" t="t" r="r" b="b"/>
+                  <a:pathLst>
+                    <a:path w="495582" h="846940">
+                      <a:moveTo>
+                        <a:pt x="495582" y="846940"/>
+                      </a:moveTo>
+                      <a:lnTo>
+                        <a:pt x="0" y="846940"/>
+                      </a:lnTo>
+                      <a:lnTo>
+                        <a:pt x="1" y="846939"/>
+                      </a:lnTo>
+                      <a:lnTo>
+                        <a:pt x="409807" y="846939"/>
+                      </a:lnTo>
+                      <a:lnTo>
+                        <a:pt x="216735" y="113206"/>
+                      </a:lnTo>
+                      <a:lnTo>
+                        <a:pt x="250175" y="0"/>
+                      </a:lnTo>
+                      <a:close/>
+                    </a:path>
+                  </a:pathLst>
+                </a:custGeom>
+                <a:solidFill>
+                  <a:srgbClr val="FFFFFF">
+                    <a:alpha val="40000"/>
+                  </a:srgbClr>
+                </a:solidFill>
+                <a:ln>
+                  <a:noFill/>
+                </a:ln>
+                <a:extLst/>
+              </p:spPr>
+              <p:txBody>
+                <a:bodyPr lIns="0" tIns="0" rIns="0" bIns="0" rtlCol="0" anchor="ctr"/>
+                <a:lstStyle/>
+                <a:p>
+                  <a:pPr algn="ctr"/>
+                  <a:endParaRPr lang="es-ES"/>
+                </a:p>
+              </p:txBody>
+            </p:sp>
+            <p:sp>
+              <p:nvSpPr>
+                <p:cNvPr id="36" name="Triángulo isósceles 21"/>
+                <p:cNvSpPr/>
+                <p:nvPr/>
+              </p:nvSpPr>
+              <p:spPr bwMode="auto">
+                <a:xfrm rot="16200000">
+                  <a:off x="12830383" y="6272670"/>
+                  <a:ext cx="130177" cy="225025"/>
+                </a:xfrm>
+                <a:prstGeom prst="triangle">
+                  <a:avLst>
+                    <a:gd name="adj" fmla="val 50481"/>
+                  </a:avLst>
+                </a:prstGeom>
+                <a:solidFill>
+                  <a:srgbClr val="223D53"/>
+                </a:solidFill>
+                <a:ln>
+                  <a:noFill/>
+                </a:ln>
+                <a:extLst/>
+              </p:spPr>
+              <p:txBody>
+                <a:bodyPr lIns="0" tIns="0" rIns="0" bIns="0" rtlCol="0" anchor="ctr"/>
+                <a:lstStyle/>
+                <a:p>
+                  <a:pPr algn="ctr"/>
+                  <a:endParaRPr lang="es-ES"/>
+                </a:p>
+              </p:txBody>
+            </p:sp>
+          </p:grpSp>
+          <p:sp>
+            <p:nvSpPr>
+              <p:cNvPr id="29" name="Forma libre 35"/>
+              <p:cNvSpPr/>
+              <p:nvPr/>
+            </p:nvSpPr>
+            <p:spPr bwMode="auto">
+              <a:xfrm>
+                <a:off x="11893860" y="9279977"/>
+                <a:ext cx="3096986" cy="2999364"/>
+              </a:xfrm>
+              <a:custGeom>
+                <a:avLst/>
+                <a:gdLst>
+                  <a:gd name="connsiteX0" fmla="*/ 668 w 2750200"/>
+                  <a:gd name="connsiteY0" fmla="*/ 0 h 2669567"/>
+                  <a:gd name="connsiteX1" fmla="*/ 672 w 2750200"/>
+                  <a:gd name="connsiteY1" fmla="*/ 0 h 2669567"/>
+                  <a:gd name="connsiteX2" fmla="*/ 780078 w 2750200"/>
+                  <a:gd name="connsiteY2" fmla="*/ 412375 h 2669567"/>
+                  <a:gd name="connsiteX3" fmla="*/ 781370 w 2750200"/>
+                  <a:gd name="connsiteY3" fmla="*/ 411040 h 2669567"/>
+                  <a:gd name="connsiteX4" fmla="*/ 2331202 w 2750200"/>
+                  <a:gd name="connsiteY4" fmla="*/ 1909898 h 2669567"/>
+                  <a:gd name="connsiteX5" fmla="*/ 2331202 w 2750200"/>
+                  <a:gd name="connsiteY5" fmla="*/ 1909897 h 2669567"/>
+                  <a:gd name="connsiteX6" fmla="*/ 2750200 w 2750200"/>
+                  <a:gd name="connsiteY6" fmla="*/ 2315116 h 2669567"/>
+                  <a:gd name="connsiteX7" fmla="*/ 2556040 w 2750200"/>
+                  <a:gd name="connsiteY7" fmla="*/ 2528778 h 2669567"/>
+                  <a:gd name="connsiteX8" fmla="*/ 2401154 w 2750200"/>
+                  <a:gd name="connsiteY8" fmla="*/ 2669567 h 2669567"/>
+                  <a:gd name="connsiteX9" fmla="*/ 1981493 w 2750200"/>
+                  <a:gd name="connsiteY9" fmla="*/ 2263707 h 2669567"/>
+                  <a:gd name="connsiteX10" fmla="*/ 1981492 w 2750200"/>
+                  <a:gd name="connsiteY10" fmla="*/ 2263707 h 2669567"/>
+                  <a:gd name="connsiteX11" fmla="*/ 435556 w 2750200"/>
+                  <a:gd name="connsiteY11" fmla="*/ 768615 h 2669567"/>
+                  <a:gd name="connsiteX12" fmla="*/ 116216 w 2750200"/>
+                  <a:gd name="connsiteY12" fmla="*/ 204215 h 2669567"/>
+                  <a:gd name="connsiteX13" fmla="*/ 116072 w 2750200"/>
+                  <a:gd name="connsiteY13" fmla="*/ 204364 h 2669567"/>
+                  <a:gd name="connsiteX14" fmla="*/ 0 w 2750200"/>
+                  <a:gd name="connsiteY14" fmla="*/ 692 h 2669567"/>
+                  <a:gd name="connsiteX15" fmla="*/ 1518 w 2750200"/>
+                  <a:gd name="connsiteY15" fmla="*/ 1500 h 2669567"/>
+                  <a:gd name="connsiteX0" fmla="*/ 668 w 3039507"/>
+                  <a:gd name="connsiteY0" fmla="*/ 0 h 3299521"/>
+                  <a:gd name="connsiteX1" fmla="*/ 672 w 3039507"/>
+                  <a:gd name="connsiteY1" fmla="*/ 0 h 3299521"/>
+                  <a:gd name="connsiteX2" fmla="*/ 780078 w 3039507"/>
+                  <a:gd name="connsiteY2" fmla="*/ 412375 h 3299521"/>
+                  <a:gd name="connsiteX3" fmla="*/ 781370 w 3039507"/>
+                  <a:gd name="connsiteY3" fmla="*/ 411040 h 3299521"/>
+                  <a:gd name="connsiteX4" fmla="*/ 2331202 w 3039507"/>
+                  <a:gd name="connsiteY4" fmla="*/ 1909898 h 3299521"/>
+                  <a:gd name="connsiteX5" fmla="*/ 2331202 w 3039507"/>
+                  <a:gd name="connsiteY5" fmla="*/ 1909897 h 3299521"/>
+                  <a:gd name="connsiteX6" fmla="*/ 2750200 w 3039507"/>
+                  <a:gd name="connsiteY6" fmla="*/ 2315116 h 3299521"/>
+                  <a:gd name="connsiteX7" fmla="*/ 2556040 w 3039507"/>
+                  <a:gd name="connsiteY7" fmla="*/ 2528778 h 3299521"/>
+                  <a:gd name="connsiteX8" fmla="*/ 3039507 w 3039507"/>
+                  <a:gd name="connsiteY8" fmla="*/ 3299521 h 3299521"/>
+                  <a:gd name="connsiteX9" fmla="*/ 1981493 w 3039507"/>
+                  <a:gd name="connsiteY9" fmla="*/ 2263707 h 3299521"/>
+                  <a:gd name="connsiteX10" fmla="*/ 1981492 w 3039507"/>
+                  <a:gd name="connsiteY10" fmla="*/ 2263707 h 3299521"/>
+                  <a:gd name="connsiteX11" fmla="*/ 435556 w 3039507"/>
+                  <a:gd name="connsiteY11" fmla="*/ 768615 h 3299521"/>
+                  <a:gd name="connsiteX12" fmla="*/ 116216 w 3039507"/>
+                  <a:gd name="connsiteY12" fmla="*/ 204215 h 3299521"/>
+                  <a:gd name="connsiteX13" fmla="*/ 116072 w 3039507"/>
+                  <a:gd name="connsiteY13" fmla="*/ 204364 h 3299521"/>
+                  <a:gd name="connsiteX14" fmla="*/ 0 w 3039507"/>
+                  <a:gd name="connsiteY14" fmla="*/ 692 h 3299521"/>
+                  <a:gd name="connsiteX15" fmla="*/ 1518 w 3039507"/>
+                  <a:gd name="connsiteY15" fmla="*/ 1500 h 3299521"/>
+                  <a:gd name="connsiteX16" fmla="*/ 668 w 3039507"/>
+                  <a:gd name="connsiteY16" fmla="*/ 0 h 3299521"/>
+                  <a:gd name="connsiteX0" fmla="*/ 668 w 3455748"/>
+                  <a:gd name="connsiteY0" fmla="*/ 0 h 3299521"/>
+                  <a:gd name="connsiteX1" fmla="*/ 672 w 3455748"/>
+                  <a:gd name="connsiteY1" fmla="*/ 0 h 3299521"/>
+                  <a:gd name="connsiteX2" fmla="*/ 780078 w 3455748"/>
+                  <a:gd name="connsiteY2" fmla="*/ 412375 h 3299521"/>
+                  <a:gd name="connsiteX3" fmla="*/ 781370 w 3455748"/>
+                  <a:gd name="connsiteY3" fmla="*/ 411040 h 3299521"/>
+                  <a:gd name="connsiteX4" fmla="*/ 2331202 w 3455748"/>
+                  <a:gd name="connsiteY4" fmla="*/ 1909898 h 3299521"/>
+                  <a:gd name="connsiteX5" fmla="*/ 2331202 w 3455748"/>
+                  <a:gd name="connsiteY5" fmla="*/ 1909897 h 3299521"/>
+                  <a:gd name="connsiteX6" fmla="*/ 3455748 w 3455748"/>
+                  <a:gd name="connsiteY6" fmla="*/ 3029064 h 3299521"/>
+                  <a:gd name="connsiteX7" fmla="*/ 2556040 w 3455748"/>
+                  <a:gd name="connsiteY7" fmla="*/ 2528778 h 3299521"/>
+                  <a:gd name="connsiteX8" fmla="*/ 3039507 w 3455748"/>
+                  <a:gd name="connsiteY8" fmla="*/ 3299521 h 3299521"/>
+                  <a:gd name="connsiteX9" fmla="*/ 1981493 w 3455748"/>
+                  <a:gd name="connsiteY9" fmla="*/ 2263707 h 3299521"/>
+                  <a:gd name="connsiteX10" fmla="*/ 1981492 w 3455748"/>
+                  <a:gd name="connsiteY10" fmla="*/ 2263707 h 3299521"/>
+                  <a:gd name="connsiteX11" fmla="*/ 435556 w 3455748"/>
+                  <a:gd name="connsiteY11" fmla="*/ 768615 h 3299521"/>
+                  <a:gd name="connsiteX12" fmla="*/ 116216 w 3455748"/>
+                  <a:gd name="connsiteY12" fmla="*/ 204215 h 3299521"/>
+                  <a:gd name="connsiteX13" fmla="*/ 116072 w 3455748"/>
+                  <a:gd name="connsiteY13" fmla="*/ 204364 h 3299521"/>
+                  <a:gd name="connsiteX14" fmla="*/ 0 w 3455748"/>
+                  <a:gd name="connsiteY14" fmla="*/ 692 h 3299521"/>
+                  <a:gd name="connsiteX15" fmla="*/ 1518 w 3455748"/>
+                  <a:gd name="connsiteY15" fmla="*/ 1500 h 3299521"/>
+                  <a:gd name="connsiteX16" fmla="*/ 668 w 3455748"/>
+                  <a:gd name="connsiteY16" fmla="*/ 0 h 3299521"/>
+                  <a:gd name="connsiteX0" fmla="*/ 668 w 3455748"/>
+                  <a:gd name="connsiteY0" fmla="*/ 0 h 3299521"/>
+                  <a:gd name="connsiteX1" fmla="*/ 672 w 3455748"/>
+                  <a:gd name="connsiteY1" fmla="*/ 0 h 3299521"/>
+                  <a:gd name="connsiteX2" fmla="*/ 780078 w 3455748"/>
+                  <a:gd name="connsiteY2" fmla="*/ 412375 h 3299521"/>
+                  <a:gd name="connsiteX3" fmla="*/ 781370 w 3455748"/>
+                  <a:gd name="connsiteY3" fmla="*/ 411040 h 3299521"/>
+                  <a:gd name="connsiteX4" fmla="*/ 2331202 w 3455748"/>
+                  <a:gd name="connsiteY4" fmla="*/ 1909898 h 3299521"/>
+                  <a:gd name="connsiteX5" fmla="*/ 2331202 w 3455748"/>
+                  <a:gd name="connsiteY5" fmla="*/ 1909897 h 3299521"/>
+                  <a:gd name="connsiteX6" fmla="*/ 3455748 w 3455748"/>
+                  <a:gd name="connsiteY6" fmla="*/ 3029064 h 3299521"/>
+                  <a:gd name="connsiteX7" fmla="*/ 3211192 w 3455748"/>
+                  <a:gd name="connsiteY7" fmla="*/ 3200729 h 3299521"/>
+                  <a:gd name="connsiteX8" fmla="*/ 3039507 w 3455748"/>
+                  <a:gd name="connsiteY8" fmla="*/ 3299521 h 3299521"/>
+                  <a:gd name="connsiteX9" fmla="*/ 1981493 w 3455748"/>
+                  <a:gd name="connsiteY9" fmla="*/ 2263707 h 3299521"/>
+                  <a:gd name="connsiteX10" fmla="*/ 1981492 w 3455748"/>
+                  <a:gd name="connsiteY10" fmla="*/ 2263707 h 3299521"/>
+                  <a:gd name="connsiteX11" fmla="*/ 435556 w 3455748"/>
+                  <a:gd name="connsiteY11" fmla="*/ 768615 h 3299521"/>
+                  <a:gd name="connsiteX12" fmla="*/ 116216 w 3455748"/>
+                  <a:gd name="connsiteY12" fmla="*/ 204215 h 3299521"/>
+                  <a:gd name="connsiteX13" fmla="*/ 116072 w 3455748"/>
+                  <a:gd name="connsiteY13" fmla="*/ 204364 h 3299521"/>
+                  <a:gd name="connsiteX14" fmla="*/ 0 w 3455748"/>
+                  <a:gd name="connsiteY14" fmla="*/ 692 h 3299521"/>
+                  <a:gd name="connsiteX15" fmla="*/ 1518 w 3455748"/>
+                  <a:gd name="connsiteY15" fmla="*/ 1500 h 3299521"/>
+                  <a:gd name="connsiteX16" fmla="*/ 668 w 3455748"/>
+                  <a:gd name="connsiteY16" fmla="*/ 0 h 3299521"/>
+                  <a:gd name="connsiteX0" fmla="*/ 668 w 3455748"/>
+                  <a:gd name="connsiteY0" fmla="*/ 0 h 3299521"/>
+                  <a:gd name="connsiteX1" fmla="*/ 672 w 3455748"/>
+                  <a:gd name="connsiteY1" fmla="*/ 0 h 3299521"/>
+                  <a:gd name="connsiteX2" fmla="*/ 780078 w 3455748"/>
+                  <a:gd name="connsiteY2" fmla="*/ 412375 h 3299521"/>
+                  <a:gd name="connsiteX3" fmla="*/ 781370 w 3455748"/>
+                  <a:gd name="connsiteY3" fmla="*/ 411040 h 3299521"/>
+                  <a:gd name="connsiteX4" fmla="*/ 2331202 w 3455748"/>
+                  <a:gd name="connsiteY4" fmla="*/ 1909898 h 3299521"/>
+                  <a:gd name="connsiteX5" fmla="*/ 2331202 w 3455748"/>
+                  <a:gd name="connsiteY5" fmla="*/ 1909897 h 3299521"/>
+                  <a:gd name="connsiteX6" fmla="*/ 3455748 w 3455748"/>
+                  <a:gd name="connsiteY6" fmla="*/ 3029064 h 3299521"/>
+                  <a:gd name="connsiteX7" fmla="*/ 3039507 w 3455748"/>
+                  <a:gd name="connsiteY7" fmla="*/ 3299521 h 3299521"/>
+                  <a:gd name="connsiteX8" fmla="*/ 1981493 w 3455748"/>
+                  <a:gd name="connsiteY8" fmla="*/ 2263707 h 3299521"/>
+                  <a:gd name="connsiteX9" fmla="*/ 1981492 w 3455748"/>
+                  <a:gd name="connsiteY9" fmla="*/ 2263707 h 3299521"/>
+                  <a:gd name="connsiteX10" fmla="*/ 435556 w 3455748"/>
+                  <a:gd name="connsiteY10" fmla="*/ 768615 h 3299521"/>
+                  <a:gd name="connsiteX11" fmla="*/ 116216 w 3455748"/>
+                  <a:gd name="connsiteY11" fmla="*/ 204215 h 3299521"/>
+                  <a:gd name="connsiteX12" fmla="*/ 116072 w 3455748"/>
+                  <a:gd name="connsiteY12" fmla="*/ 204364 h 3299521"/>
+                  <a:gd name="connsiteX13" fmla="*/ 0 w 3455748"/>
+                  <a:gd name="connsiteY13" fmla="*/ 692 h 3299521"/>
+                  <a:gd name="connsiteX14" fmla="*/ 1518 w 3455748"/>
+                  <a:gd name="connsiteY14" fmla="*/ 1500 h 3299521"/>
+                  <a:gd name="connsiteX15" fmla="*/ 668 w 3455748"/>
+                  <a:gd name="connsiteY15" fmla="*/ 0 h 3299521"/>
+                  <a:gd name="connsiteX0" fmla="*/ 668 w 3413751"/>
+                  <a:gd name="connsiteY0" fmla="*/ 0 h 3299521"/>
+                  <a:gd name="connsiteX1" fmla="*/ 672 w 3413751"/>
+                  <a:gd name="connsiteY1" fmla="*/ 0 h 3299521"/>
+                  <a:gd name="connsiteX2" fmla="*/ 780078 w 3413751"/>
+                  <a:gd name="connsiteY2" fmla="*/ 412375 h 3299521"/>
+                  <a:gd name="connsiteX3" fmla="*/ 781370 w 3413751"/>
+                  <a:gd name="connsiteY3" fmla="*/ 411040 h 3299521"/>
+                  <a:gd name="connsiteX4" fmla="*/ 2331202 w 3413751"/>
+                  <a:gd name="connsiteY4" fmla="*/ 1909898 h 3299521"/>
+                  <a:gd name="connsiteX5" fmla="*/ 2331202 w 3413751"/>
+                  <a:gd name="connsiteY5" fmla="*/ 1909897 h 3299521"/>
+                  <a:gd name="connsiteX6" fmla="*/ 3413751 w 3413751"/>
+                  <a:gd name="connsiteY6" fmla="*/ 2995466 h 3299521"/>
+                  <a:gd name="connsiteX7" fmla="*/ 3039507 w 3413751"/>
+                  <a:gd name="connsiteY7" fmla="*/ 3299521 h 3299521"/>
+                  <a:gd name="connsiteX8" fmla="*/ 1981493 w 3413751"/>
+                  <a:gd name="connsiteY8" fmla="*/ 2263707 h 3299521"/>
+                  <a:gd name="connsiteX9" fmla="*/ 1981492 w 3413751"/>
+                  <a:gd name="connsiteY9" fmla="*/ 2263707 h 3299521"/>
+                  <a:gd name="connsiteX10" fmla="*/ 435556 w 3413751"/>
+                  <a:gd name="connsiteY10" fmla="*/ 768615 h 3299521"/>
+                  <a:gd name="connsiteX11" fmla="*/ 116216 w 3413751"/>
+                  <a:gd name="connsiteY11" fmla="*/ 204215 h 3299521"/>
+                  <a:gd name="connsiteX12" fmla="*/ 116072 w 3413751"/>
+                  <a:gd name="connsiteY12" fmla="*/ 204364 h 3299521"/>
+                  <a:gd name="connsiteX13" fmla="*/ 0 w 3413751"/>
+                  <a:gd name="connsiteY13" fmla="*/ 692 h 3299521"/>
+                  <a:gd name="connsiteX14" fmla="*/ 1518 w 3413751"/>
+                  <a:gd name="connsiteY14" fmla="*/ 1500 h 3299521"/>
+                  <a:gd name="connsiteX15" fmla="*/ 668 w 3413751"/>
+                  <a:gd name="connsiteY15" fmla="*/ 0 h 3299521"/>
+                  <a:gd name="connsiteX0" fmla="*/ 668 w 3413751"/>
+                  <a:gd name="connsiteY0" fmla="*/ 0 h 3299521"/>
+                  <a:gd name="connsiteX1" fmla="*/ 672 w 3413751"/>
+                  <a:gd name="connsiteY1" fmla="*/ 0 h 3299521"/>
+                  <a:gd name="connsiteX2" fmla="*/ 780078 w 3413751"/>
+                  <a:gd name="connsiteY2" fmla="*/ 412375 h 3299521"/>
+                  <a:gd name="connsiteX3" fmla="*/ 781370 w 3413751"/>
+                  <a:gd name="connsiteY3" fmla="*/ 411040 h 3299521"/>
+                  <a:gd name="connsiteX4" fmla="*/ 2331202 w 3413751"/>
+                  <a:gd name="connsiteY4" fmla="*/ 1909898 h 3299521"/>
+                  <a:gd name="connsiteX5" fmla="*/ 2331202 w 3413751"/>
+                  <a:gd name="connsiteY5" fmla="*/ 1909897 h 3299521"/>
+                  <a:gd name="connsiteX6" fmla="*/ 3413751 w 3413751"/>
+                  <a:gd name="connsiteY6" fmla="*/ 2995466 h 3299521"/>
+                  <a:gd name="connsiteX7" fmla="*/ 3218023 w 3413751"/>
+                  <a:gd name="connsiteY7" fmla="*/ 3151077 h 3299521"/>
+                  <a:gd name="connsiteX8" fmla="*/ 3039507 w 3413751"/>
+                  <a:gd name="connsiteY8" fmla="*/ 3299521 h 3299521"/>
+                  <a:gd name="connsiteX9" fmla="*/ 1981493 w 3413751"/>
+                  <a:gd name="connsiteY9" fmla="*/ 2263707 h 3299521"/>
+                  <a:gd name="connsiteX10" fmla="*/ 1981492 w 3413751"/>
+                  <a:gd name="connsiteY10" fmla="*/ 2263707 h 3299521"/>
+                  <a:gd name="connsiteX11" fmla="*/ 435556 w 3413751"/>
+                  <a:gd name="connsiteY11" fmla="*/ 768615 h 3299521"/>
+                  <a:gd name="connsiteX12" fmla="*/ 116216 w 3413751"/>
+                  <a:gd name="connsiteY12" fmla="*/ 204215 h 3299521"/>
+                  <a:gd name="connsiteX13" fmla="*/ 116072 w 3413751"/>
+                  <a:gd name="connsiteY13" fmla="*/ 204364 h 3299521"/>
+                  <a:gd name="connsiteX14" fmla="*/ 0 w 3413751"/>
+                  <a:gd name="connsiteY14" fmla="*/ 692 h 3299521"/>
+                  <a:gd name="connsiteX15" fmla="*/ 1518 w 3413751"/>
+                  <a:gd name="connsiteY15" fmla="*/ 1500 h 3299521"/>
+                  <a:gd name="connsiteX16" fmla="*/ 668 w 3413751"/>
+                  <a:gd name="connsiteY16" fmla="*/ 0 h 3299521"/>
+                  <a:gd name="connsiteX0" fmla="*/ 668 w 3456151"/>
+                  <a:gd name="connsiteY0" fmla="*/ 0 h 3346283"/>
+                  <a:gd name="connsiteX1" fmla="*/ 672 w 3456151"/>
+                  <a:gd name="connsiteY1" fmla="*/ 0 h 3346283"/>
+                  <a:gd name="connsiteX2" fmla="*/ 780078 w 3456151"/>
+                  <a:gd name="connsiteY2" fmla="*/ 412375 h 3346283"/>
+                  <a:gd name="connsiteX3" fmla="*/ 781370 w 3456151"/>
+                  <a:gd name="connsiteY3" fmla="*/ 411040 h 3346283"/>
+                  <a:gd name="connsiteX4" fmla="*/ 2331202 w 3456151"/>
+                  <a:gd name="connsiteY4" fmla="*/ 1909898 h 3346283"/>
+                  <a:gd name="connsiteX5" fmla="*/ 2331202 w 3456151"/>
+                  <a:gd name="connsiteY5" fmla="*/ 1909897 h 3346283"/>
+                  <a:gd name="connsiteX6" fmla="*/ 3413751 w 3456151"/>
+                  <a:gd name="connsiteY6" fmla="*/ 2995466 h 3346283"/>
+                  <a:gd name="connsiteX7" fmla="*/ 3218023 w 3456151"/>
+                  <a:gd name="connsiteY7" fmla="*/ 3151077 h 3346283"/>
+                  <a:gd name="connsiteX8" fmla="*/ 3039507 w 3456151"/>
+                  <a:gd name="connsiteY8" fmla="*/ 3299521 h 3346283"/>
+                  <a:gd name="connsiteX9" fmla="*/ 1981493 w 3456151"/>
+                  <a:gd name="connsiteY9" fmla="*/ 2263707 h 3346283"/>
+                  <a:gd name="connsiteX10" fmla="*/ 1981492 w 3456151"/>
+                  <a:gd name="connsiteY10" fmla="*/ 2263707 h 3346283"/>
+                  <a:gd name="connsiteX11" fmla="*/ 435556 w 3456151"/>
+                  <a:gd name="connsiteY11" fmla="*/ 768615 h 3346283"/>
+                  <a:gd name="connsiteX12" fmla="*/ 116216 w 3456151"/>
+                  <a:gd name="connsiteY12" fmla="*/ 204215 h 3346283"/>
+                  <a:gd name="connsiteX13" fmla="*/ 116072 w 3456151"/>
+                  <a:gd name="connsiteY13" fmla="*/ 204364 h 3346283"/>
+                  <a:gd name="connsiteX14" fmla="*/ 0 w 3456151"/>
+                  <a:gd name="connsiteY14" fmla="*/ 692 h 3346283"/>
+                  <a:gd name="connsiteX15" fmla="*/ 1518 w 3456151"/>
+                  <a:gd name="connsiteY15" fmla="*/ 1500 h 3346283"/>
+                  <a:gd name="connsiteX16" fmla="*/ 668 w 3456151"/>
+                  <a:gd name="connsiteY16" fmla="*/ 0 h 3346283"/>
+                  <a:gd name="connsiteX0" fmla="*/ 668 w 3465784"/>
+                  <a:gd name="connsiteY0" fmla="*/ 0 h 3357167"/>
+                  <a:gd name="connsiteX1" fmla="*/ 672 w 3465784"/>
+                  <a:gd name="connsiteY1" fmla="*/ 0 h 3357167"/>
+                  <a:gd name="connsiteX2" fmla="*/ 780078 w 3465784"/>
+                  <a:gd name="connsiteY2" fmla="*/ 412375 h 3357167"/>
+                  <a:gd name="connsiteX3" fmla="*/ 781370 w 3465784"/>
+                  <a:gd name="connsiteY3" fmla="*/ 411040 h 3357167"/>
+                  <a:gd name="connsiteX4" fmla="*/ 2331202 w 3465784"/>
+                  <a:gd name="connsiteY4" fmla="*/ 1909898 h 3357167"/>
+                  <a:gd name="connsiteX5" fmla="*/ 2331202 w 3465784"/>
+                  <a:gd name="connsiteY5" fmla="*/ 1909897 h 3357167"/>
+                  <a:gd name="connsiteX6" fmla="*/ 3413751 w 3465784"/>
+                  <a:gd name="connsiteY6" fmla="*/ 2995466 h 3357167"/>
+                  <a:gd name="connsiteX7" fmla="*/ 3291518 w 3465784"/>
+                  <a:gd name="connsiteY7" fmla="*/ 3219322 h 3357167"/>
+                  <a:gd name="connsiteX8" fmla="*/ 3039507 w 3465784"/>
+                  <a:gd name="connsiteY8" fmla="*/ 3299521 h 3357167"/>
+                  <a:gd name="connsiteX9" fmla="*/ 1981493 w 3465784"/>
+                  <a:gd name="connsiteY9" fmla="*/ 2263707 h 3357167"/>
+                  <a:gd name="connsiteX10" fmla="*/ 1981492 w 3465784"/>
+                  <a:gd name="connsiteY10" fmla="*/ 2263707 h 3357167"/>
+                  <a:gd name="connsiteX11" fmla="*/ 435556 w 3465784"/>
+                  <a:gd name="connsiteY11" fmla="*/ 768615 h 3357167"/>
+                  <a:gd name="connsiteX12" fmla="*/ 116216 w 3465784"/>
+                  <a:gd name="connsiteY12" fmla="*/ 204215 h 3357167"/>
+                  <a:gd name="connsiteX13" fmla="*/ 116072 w 3465784"/>
+                  <a:gd name="connsiteY13" fmla="*/ 204364 h 3357167"/>
+                  <a:gd name="connsiteX14" fmla="*/ 0 w 3465784"/>
+                  <a:gd name="connsiteY14" fmla="*/ 692 h 3357167"/>
+                  <a:gd name="connsiteX15" fmla="*/ 1518 w 3465784"/>
+                  <a:gd name="connsiteY15" fmla="*/ 1500 h 3357167"/>
+                  <a:gd name="connsiteX16" fmla="*/ 668 w 3465784"/>
+                  <a:gd name="connsiteY16" fmla="*/ 0 h 3357167"/>
+                  <a:gd name="connsiteX0" fmla="*/ 668 w 3468125"/>
+                  <a:gd name="connsiteY0" fmla="*/ 0 h 3356274"/>
+                  <a:gd name="connsiteX1" fmla="*/ 672 w 3468125"/>
+                  <a:gd name="connsiteY1" fmla="*/ 0 h 3356274"/>
+                  <a:gd name="connsiteX2" fmla="*/ 780078 w 3468125"/>
+                  <a:gd name="connsiteY2" fmla="*/ 412375 h 3356274"/>
+                  <a:gd name="connsiteX3" fmla="*/ 781370 w 3468125"/>
+                  <a:gd name="connsiteY3" fmla="*/ 411040 h 3356274"/>
+                  <a:gd name="connsiteX4" fmla="*/ 2331202 w 3468125"/>
+                  <a:gd name="connsiteY4" fmla="*/ 1909898 h 3356274"/>
+                  <a:gd name="connsiteX5" fmla="*/ 2331202 w 3468125"/>
+                  <a:gd name="connsiteY5" fmla="*/ 1909897 h 3356274"/>
+                  <a:gd name="connsiteX6" fmla="*/ 3413751 w 3468125"/>
+                  <a:gd name="connsiteY6" fmla="*/ 2995466 h 3356274"/>
+                  <a:gd name="connsiteX7" fmla="*/ 3291518 w 3468125"/>
+                  <a:gd name="connsiteY7" fmla="*/ 3219322 h 3356274"/>
+                  <a:gd name="connsiteX8" fmla="*/ 3039507 w 3468125"/>
+                  <a:gd name="connsiteY8" fmla="*/ 3299521 h 3356274"/>
+                  <a:gd name="connsiteX9" fmla="*/ 1981493 w 3468125"/>
+                  <a:gd name="connsiteY9" fmla="*/ 2263707 h 3356274"/>
+                  <a:gd name="connsiteX10" fmla="*/ 1981492 w 3468125"/>
+                  <a:gd name="connsiteY10" fmla="*/ 2263707 h 3356274"/>
+                  <a:gd name="connsiteX11" fmla="*/ 435556 w 3468125"/>
+                  <a:gd name="connsiteY11" fmla="*/ 768615 h 3356274"/>
+                  <a:gd name="connsiteX12" fmla="*/ 116216 w 3468125"/>
+                  <a:gd name="connsiteY12" fmla="*/ 204215 h 3356274"/>
+                  <a:gd name="connsiteX13" fmla="*/ 116072 w 3468125"/>
+                  <a:gd name="connsiteY13" fmla="*/ 204364 h 3356274"/>
+                  <a:gd name="connsiteX14" fmla="*/ 0 w 3468125"/>
+                  <a:gd name="connsiteY14" fmla="*/ 692 h 3356274"/>
+                  <a:gd name="connsiteX15" fmla="*/ 1518 w 3468125"/>
+                  <a:gd name="connsiteY15" fmla="*/ 1500 h 3356274"/>
+                  <a:gd name="connsiteX16" fmla="*/ 668 w 3468125"/>
+                  <a:gd name="connsiteY16" fmla="*/ 0 h 3356274"/>
+                  <a:gd name="connsiteX0" fmla="*/ 668 w 3468125"/>
+                  <a:gd name="connsiteY0" fmla="*/ 0 h 3302727"/>
+                  <a:gd name="connsiteX1" fmla="*/ 672 w 3468125"/>
+                  <a:gd name="connsiteY1" fmla="*/ 0 h 3302727"/>
+                  <a:gd name="connsiteX2" fmla="*/ 780078 w 3468125"/>
+                  <a:gd name="connsiteY2" fmla="*/ 412375 h 3302727"/>
+                  <a:gd name="connsiteX3" fmla="*/ 781370 w 3468125"/>
+                  <a:gd name="connsiteY3" fmla="*/ 411040 h 3302727"/>
+                  <a:gd name="connsiteX4" fmla="*/ 2331202 w 3468125"/>
+                  <a:gd name="connsiteY4" fmla="*/ 1909898 h 3302727"/>
+                  <a:gd name="connsiteX5" fmla="*/ 2331202 w 3468125"/>
+                  <a:gd name="connsiteY5" fmla="*/ 1909897 h 3302727"/>
+                  <a:gd name="connsiteX6" fmla="*/ 3413751 w 3468125"/>
+                  <a:gd name="connsiteY6" fmla="*/ 2995466 h 3302727"/>
+                  <a:gd name="connsiteX7" fmla="*/ 3291518 w 3468125"/>
+                  <a:gd name="connsiteY7" fmla="*/ 3219322 h 3302727"/>
+                  <a:gd name="connsiteX8" fmla="*/ 3039507 w 3468125"/>
+                  <a:gd name="connsiteY8" fmla="*/ 3299521 h 3302727"/>
+                  <a:gd name="connsiteX9" fmla="*/ 1981493 w 3468125"/>
+                  <a:gd name="connsiteY9" fmla="*/ 2263707 h 3302727"/>
+                  <a:gd name="connsiteX10" fmla="*/ 1981492 w 3468125"/>
+                  <a:gd name="connsiteY10" fmla="*/ 2263707 h 3302727"/>
+                  <a:gd name="connsiteX11" fmla="*/ 435556 w 3468125"/>
+                  <a:gd name="connsiteY11" fmla="*/ 768615 h 3302727"/>
+                  <a:gd name="connsiteX12" fmla="*/ 116216 w 3468125"/>
+                  <a:gd name="connsiteY12" fmla="*/ 204215 h 3302727"/>
+                  <a:gd name="connsiteX13" fmla="*/ 116072 w 3468125"/>
+                  <a:gd name="connsiteY13" fmla="*/ 204364 h 3302727"/>
+                  <a:gd name="connsiteX14" fmla="*/ 0 w 3468125"/>
+                  <a:gd name="connsiteY14" fmla="*/ 692 h 3302727"/>
+                  <a:gd name="connsiteX15" fmla="*/ 1518 w 3468125"/>
+                  <a:gd name="connsiteY15" fmla="*/ 1500 h 3302727"/>
+                  <a:gd name="connsiteX16" fmla="*/ 668 w 3468125"/>
+                  <a:gd name="connsiteY16" fmla="*/ 0 h 3302727"/>
+                  <a:gd name="connsiteX0" fmla="*/ 668 w 3413751"/>
+                  <a:gd name="connsiteY0" fmla="*/ 0 h 3302727"/>
+                  <a:gd name="connsiteX1" fmla="*/ 672 w 3413751"/>
+                  <a:gd name="connsiteY1" fmla="*/ 0 h 3302727"/>
+                  <a:gd name="connsiteX2" fmla="*/ 780078 w 3413751"/>
+                  <a:gd name="connsiteY2" fmla="*/ 412375 h 3302727"/>
+                  <a:gd name="connsiteX3" fmla="*/ 781370 w 3413751"/>
+                  <a:gd name="connsiteY3" fmla="*/ 411040 h 3302727"/>
+                  <a:gd name="connsiteX4" fmla="*/ 2331202 w 3413751"/>
+                  <a:gd name="connsiteY4" fmla="*/ 1909898 h 3302727"/>
+                  <a:gd name="connsiteX5" fmla="*/ 2331202 w 3413751"/>
+                  <a:gd name="connsiteY5" fmla="*/ 1909897 h 3302727"/>
+                  <a:gd name="connsiteX6" fmla="*/ 3413751 w 3413751"/>
+                  <a:gd name="connsiteY6" fmla="*/ 2995466 h 3302727"/>
+                  <a:gd name="connsiteX7" fmla="*/ 3291518 w 3413751"/>
+                  <a:gd name="connsiteY7" fmla="*/ 3219322 h 3302727"/>
+                  <a:gd name="connsiteX8" fmla="*/ 3039507 w 3413751"/>
+                  <a:gd name="connsiteY8" fmla="*/ 3299521 h 3302727"/>
+                  <a:gd name="connsiteX9" fmla="*/ 1981493 w 3413751"/>
+                  <a:gd name="connsiteY9" fmla="*/ 2263707 h 3302727"/>
+                  <a:gd name="connsiteX10" fmla="*/ 1981492 w 3413751"/>
+                  <a:gd name="connsiteY10" fmla="*/ 2263707 h 3302727"/>
+                  <a:gd name="connsiteX11" fmla="*/ 435556 w 3413751"/>
+                  <a:gd name="connsiteY11" fmla="*/ 768615 h 3302727"/>
+                  <a:gd name="connsiteX12" fmla="*/ 116216 w 3413751"/>
+                  <a:gd name="connsiteY12" fmla="*/ 204215 h 3302727"/>
+                  <a:gd name="connsiteX13" fmla="*/ 116072 w 3413751"/>
+                  <a:gd name="connsiteY13" fmla="*/ 204364 h 3302727"/>
+                  <a:gd name="connsiteX14" fmla="*/ 0 w 3413751"/>
+                  <a:gd name="connsiteY14" fmla="*/ 692 h 3302727"/>
+                  <a:gd name="connsiteX15" fmla="*/ 1518 w 3413751"/>
+                  <a:gd name="connsiteY15" fmla="*/ 1500 h 3302727"/>
+                  <a:gd name="connsiteX16" fmla="*/ 668 w 3413751"/>
+                  <a:gd name="connsiteY16" fmla="*/ 0 h 3302727"/>
+                  <a:gd name="connsiteX0" fmla="*/ 668 w 3413751"/>
+                  <a:gd name="connsiteY0" fmla="*/ 0 h 3302727"/>
+                  <a:gd name="connsiteX1" fmla="*/ 672 w 3413751"/>
+                  <a:gd name="connsiteY1" fmla="*/ 0 h 3302727"/>
+                  <a:gd name="connsiteX2" fmla="*/ 780078 w 3413751"/>
+                  <a:gd name="connsiteY2" fmla="*/ 412375 h 3302727"/>
+                  <a:gd name="connsiteX3" fmla="*/ 781370 w 3413751"/>
+                  <a:gd name="connsiteY3" fmla="*/ 411040 h 3302727"/>
+                  <a:gd name="connsiteX4" fmla="*/ 2331202 w 3413751"/>
+                  <a:gd name="connsiteY4" fmla="*/ 1909898 h 3302727"/>
+                  <a:gd name="connsiteX5" fmla="*/ 2331202 w 3413751"/>
+                  <a:gd name="connsiteY5" fmla="*/ 1909897 h 3302727"/>
+                  <a:gd name="connsiteX6" fmla="*/ 3413751 w 3413751"/>
+                  <a:gd name="connsiteY6" fmla="*/ 2995466 h 3302727"/>
+                  <a:gd name="connsiteX7" fmla="*/ 3291518 w 3413751"/>
+                  <a:gd name="connsiteY7" fmla="*/ 3219322 h 3302727"/>
+                  <a:gd name="connsiteX8" fmla="*/ 3039507 w 3413751"/>
+                  <a:gd name="connsiteY8" fmla="*/ 3299521 h 3302727"/>
+                  <a:gd name="connsiteX9" fmla="*/ 1981493 w 3413751"/>
+                  <a:gd name="connsiteY9" fmla="*/ 2263707 h 3302727"/>
+                  <a:gd name="connsiteX10" fmla="*/ 1981492 w 3413751"/>
+                  <a:gd name="connsiteY10" fmla="*/ 2263707 h 3302727"/>
+                  <a:gd name="connsiteX11" fmla="*/ 435556 w 3413751"/>
+                  <a:gd name="connsiteY11" fmla="*/ 768615 h 3302727"/>
+                  <a:gd name="connsiteX12" fmla="*/ 116216 w 3413751"/>
+                  <a:gd name="connsiteY12" fmla="*/ 204215 h 3302727"/>
+                  <a:gd name="connsiteX13" fmla="*/ 116072 w 3413751"/>
+                  <a:gd name="connsiteY13" fmla="*/ 204364 h 3302727"/>
+                  <a:gd name="connsiteX14" fmla="*/ 0 w 3413751"/>
+                  <a:gd name="connsiteY14" fmla="*/ 692 h 3302727"/>
+                  <a:gd name="connsiteX15" fmla="*/ 1518 w 3413751"/>
+                  <a:gd name="connsiteY15" fmla="*/ 1500 h 3302727"/>
+                  <a:gd name="connsiteX16" fmla="*/ 668 w 3413751"/>
+                  <a:gd name="connsiteY16" fmla="*/ 0 h 3302727"/>
+                  <a:gd name="connsiteX0" fmla="*/ 668 w 3413751"/>
+                  <a:gd name="connsiteY0" fmla="*/ 0 h 3304377"/>
+                  <a:gd name="connsiteX1" fmla="*/ 672 w 3413751"/>
+                  <a:gd name="connsiteY1" fmla="*/ 0 h 3304377"/>
+                  <a:gd name="connsiteX2" fmla="*/ 780078 w 3413751"/>
+                  <a:gd name="connsiteY2" fmla="*/ 412375 h 3304377"/>
+                  <a:gd name="connsiteX3" fmla="*/ 781370 w 3413751"/>
+                  <a:gd name="connsiteY3" fmla="*/ 411040 h 3304377"/>
+                  <a:gd name="connsiteX4" fmla="*/ 2331202 w 3413751"/>
+                  <a:gd name="connsiteY4" fmla="*/ 1909898 h 3304377"/>
+                  <a:gd name="connsiteX5" fmla="*/ 2331202 w 3413751"/>
+                  <a:gd name="connsiteY5" fmla="*/ 1909897 h 3304377"/>
+                  <a:gd name="connsiteX6" fmla="*/ 3413751 w 3413751"/>
+                  <a:gd name="connsiteY6" fmla="*/ 2995466 h 3304377"/>
+                  <a:gd name="connsiteX7" fmla="*/ 3291518 w 3413751"/>
+                  <a:gd name="connsiteY7" fmla="*/ 3219322 h 3304377"/>
+                  <a:gd name="connsiteX8" fmla="*/ 3039507 w 3413751"/>
+                  <a:gd name="connsiteY8" fmla="*/ 3299521 h 3304377"/>
+                  <a:gd name="connsiteX9" fmla="*/ 1981493 w 3413751"/>
+                  <a:gd name="connsiteY9" fmla="*/ 2263707 h 3304377"/>
+                  <a:gd name="connsiteX10" fmla="*/ 1981492 w 3413751"/>
+                  <a:gd name="connsiteY10" fmla="*/ 2263707 h 3304377"/>
+                  <a:gd name="connsiteX11" fmla="*/ 435556 w 3413751"/>
+                  <a:gd name="connsiteY11" fmla="*/ 768615 h 3304377"/>
+                  <a:gd name="connsiteX12" fmla="*/ 116216 w 3413751"/>
+                  <a:gd name="connsiteY12" fmla="*/ 204215 h 3304377"/>
+                  <a:gd name="connsiteX13" fmla="*/ 116072 w 3413751"/>
+                  <a:gd name="connsiteY13" fmla="*/ 204364 h 3304377"/>
+                  <a:gd name="connsiteX14" fmla="*/ 0 w 3413751"/>
+                  <a:gd name="connsiteY14" fmla="*/ 692 h 3304377"/>
+                  <a:gd name="connsiteX15" fmla="*/ 1518 w 3413751"/>
+                  <a:gd name="connsiteY15" fmla="*/ 1500 h 3304377"/>
+                  <a:gd name="connsiteX16" fmla="*/ 668 w 3413751"/>
+                  <a:gd name="connsiteY16" fmla="*/ 0 h 3304377"/>
+                  <a:gd name="connsiteX0" fmla="*/ 668 w 3413751"/>
+                  <a:gd name="connsiteY0" fmla="*/ 0 h 3306145"/>
+                  <a:gd name="connsiteX1" fmla="*/ 672 w 3413751"/>
+                  <a:gd name="connsiteY1" fmla="*/ 0 h 3306145"/>
+                  <a:gd name="connsiteX2" fmla="*/ 780078 w 3413751"/>
+                  <a:gd name="connsiteY2" fmla="*/ 412375 h 3306145"/>
+                  <a:gd name="connsiteX3" fmla="*/ 781370 w 3413751"/>
+                  <a:gd name="connsiteY3" fmla="*/ 411040 h 3306145"/>
+                  <a:gd name="connsiteX4" fmla="*/ 2331202 w 3413751"/>
+                  <a:gd name="connsiteY4" fmla="*/ 1909898 h 3306145"/>
+                  <a:gd name="connsiteX5" fmla="*/ 2331202 w 3413751"/>
+                  <a:gd name="connsiteY5" fmla="*/ 1909897 h 3306145"/>
+                  <a:gd name="connsiteX6" fmla="*/ 3413751 w 3413751"/>
+                  <a:gd name="connsiteY6" fmla="*/ 2995466 h 3306145"/>
+                  <a:gd name="connsiteX7" fmla="*/ 3275770 w 3413751"/>
+                  <a:gd name="connsiteY7" fmla="*/ 3240321 h 3306145"/>
+                  <a:gd name="connsiteX8" fmla="*/ 3039507 w 3413751"/>
+                  <a:gd name="connsiteY8" fmla="*/ 3299521 h 3306145"/>
+                  <a:gd name="connsiteX9" fmla="*/ 1981493 w 3413751"/>
+                  <a:gd name="connsiteY9" fmla="*/ 2263707 h 3306145"/>
+                  <a:gd name="connsiteX10" fmla="*/ 1981492 w 3413751"/>
+                  <a:gd name="connsiteY10" fmla="*/ 2263707 h 3306145"/>
+                  <a:gd name="connsiteX11" fmla="*/ 435556 w 3413751"/>
+                  <a:gd name="connsiteY11" fmla="*/ 768615 h 3306145"/>
+                  <a:gd name="connsiteX12" fmla="*/ 116216 w 3413751"/>
+                  <a:gd name="connsiteY12" fmla="*/ 204215 h 3306145"/>
+                  <a:gd name="connsiteX13" fmla="*/ 116072 w 3413751"/>
+                  <a:gd name="connsiteY13" fmla="*/ 204364 h 3306145"/>
+                  <a:gd name="connsiteX14" fmla="*/ 0 w 3413751"/>
+                  <a:gd name="connsiteY14" fmla="*/ 692 h 3306145"/>
+                  <a:gd name="connsiteX15" fmla="*/ 1518 w 3413751"/>
+                  <a:gd name="connsiteY15" fmla="*/ 1500 h 3306145"/>
+                  <a:gd name="connsiteX16" fmla="*/ 668 w 3413751"/>
+                  <a:gd name="connsiteY16" fmla="*/ 0 h 3306145"/>
+                </a:gdLst>
+                <a:ahLst/>
+                <a:cxnLst>
+                  <a:cxn ang="0">
+                    <a:pos x="connsiteX0" y="connsiteY0"/>
+                  </a:cxn>
+                  <a:cxn ang="0">
+                    <a:pos x="connsiteX1" y="connsiteY1"/>
+                  </a:cxn>
+                  <a:cxn ang="0">
+                    <a:pos x="connsiteX2" y="connsiteY2"/>
+                  </a:cxn>
+                  <a:cxn ang="0">
+                    <a:pos x="connsiteX3" y="connsiteY3"/>
+                  </a:cxn>
+                  <a:cxn ang="0">
+                    <a:pos x="connsiteX4" y="connsiteY4"/>
+                  </a:cxn>
+                  <a:cxn ang="0">
+                    <a:pos x="connsiteX5" y="connsiteY5"/>
+                  </a:cxn>
+                  <a:cxn ang="0">
+                    <a:pos x="connsiteX6" y="connsiteY6"/>
+                  </a:cxn>
+                  <a:cxn ang="0">
+                    <a:pos x="connsiteX7" y="connsiteY7"/>
+                  </a:cxn>
+                  <a:cxn ang="0">
+                    <a:pos x="connsiteX8" y="connsiteY8"/>
+                  </a:cxn>
+                  <a:cxn ang="0">
+                    <a:pos x="connsiteX9" y="connsiteY9"/>
+                  </a:cxn>
+                  <a:cxn ang="0">
+                    <a:pos x="connsiteX10" y="connsiteY10"/>
+                  </a:cxn>
+                  <a:cxn ang="0">
+                    <a:pos x="connsiteX11" y="connsiteY11"/>
+                  </a:cxn>
+                  <a:cxn ang="0">
+                    <a:pos x="connsiteX12" y="connsiteY12"/>
+                  </a:cxn>
+                  <a:cxn ang="0">
+                    <a:pos x="connsiteX13" y="connsiteY13"/>
+                  </a:cxn>
+                  <a:cxn ang="0">
+                    <a:pos x="connsiteX14" y="connsiteY14"/>
+                  </a:cxn>
+                  <a:cxn ang="0">
+                    <a:pos x="connsiteX15" y="connsiteY15"/>
+                  </a:cxn>
+                  <a:cxn ang="0">
+                    <a:pos x="connsiteX16" y="connsiteY16"/>
+                  </a:cxn>
+                </a:cxnLst>
+                <a:rect l="l" t="t" r="r" b="b"/>
+                <a:pathLst>
+                  <a:path w="3413751" h="3306145">
+                    <a:moveTo>
+                      <a:pt x="668" y="0"/>
+                    </a:moveTo>
+                    <a:lnTo>
+                      <a:pt x="672" y="0"/>
+                    </a:lnTo>
+                    <a:lnTo>
+                      <a:pt x="780078" y="412375"/>
+                    </a:lnTo>
+                    <a:lnTo>
+                      <a:pt x="781370" y="411040"/>
+                    </a:lnTo>
+                    <a:lnTo>
+                      <a:pt x="2331202" y="1909898"/>
+                    </a:lnTo>
+                    <a:lnTo>
+                      <a:pt x="2331202" y="1909897"/>
+                    </a:lnTo>
+                    <a:lnTo>
+                      <a:pt x="3413751" y="2995466"/>
+                    </a:lnTo>
+                    <a:cubicBezTo>
+                      <a:pt x="3388318" y="3128834"/>
+                      <a:pt x="3353893" y="3194895"/>
+                      <a:pt x="3275770" y="3240321"/>
+                    </a:cubicBezTo>
+                    <a:cubicBezTo>
+                      <a:pt x="3197647" y="3285747"/>
+                      <a:pt x="3135352" y="3321424"/>
+                      <a:pt x="3039507" y="3299521"/>
+                    </a:cubicBezTo>
+                    <a:lnTo>
+                      <a:pt x="1981493" y="2263707"/>
+                    </a:lnTo>
+                    <a:lnTo>
+                      <a:pt x="1981492" y="2263707"/>
+                    </a:lnTo>
+                    <a:lnTo>
+                      <a:pt x="435556" y="768615"/>
+                    </a:lnTo>
+                    <a:lnTo>
+                      <a:pt x="116216" y="204215"/>
+                    </a:lnTo>
+                    <a:lnTo>
+                      <a:pt x="116072" y="204364"/>
+                    </a:lnTo>
+                    <a:lnTo>
+                      <a:pt x="0" y="692"/>
+                    </a:lnTo>
+                    <a:lnTo>
+                      <a:pt x="1518" y="1500"/>
+                    </a:lnTo>
+                    <a:lnTo>
+                      <a:pt x="668" y="0"/>
+                    </a:lnTo>
+                    <a:close/>
+                  </a:path>
+                </a:pathLst>
+              </a:custGeom>
+              <a:solidFill>
+                <a:schemeClr val="tx1">
+                  <a:lumMod val="75000"/>
+                  <a:lumOff val="25000"/>
+                  <a:alpha val="25000"/>
+                </a:schemeClr>
+              </a:solidFill>
+              <a:ln>
+                <a:noFill/>
+              </a:ln>
+              <a:extLst/>
+            </p:spPr>
+            <p:txBody>
+              <a:bodyPr lIns="0" tIns="0" rIns="0" bIns="0" rtlCol="0" anchor="ctr"/>
+              <a:lstStyle/>
+              <a:p>
+                <a:pPr algn="ctr"/>
+                <a:endParaRPr lang="es-ES"/>
+              </a:p>
+            </p:txBody>
+          </p:sp>
+        </p:grpSp>
+      </p:grpSp>
+    </p:spTree>
+    <p:extLst>
+      <p:ext uri="{BB962C8B-B14F-4D97-AF65-F5344CB8AC3E}">
+        <p14:creationId xmlns:p14="http://schemas.microsoft.com/office/powerpoint/2010/main" val="1621856148"/>
+      </p:ext>
+    </p:extLst>
+  </p:cSld>
+  <p:clrMapOvr>
+    <a:masterClrMapping/>
+  </p:clrMapOvr>
+  <p:timing>
+    <p:tnLst>
+      <p:par>
+        <p:cTn id="1" dur="indefinite" restart="never" nodeType="tmRoot">
+          <p:childTnLst>
+            <p:seq concurrent="1" nextAc="seek">
+              <p:cTn id="2" dur="indefinite" nodeType="mainSeq">
+                <p:childTnLst>
+                  <p:par>
+                    <p:cTn id="3" fill="hold">
+                      <p:stCondLst>
+                        <p:cond delay="indefinite"/>
+                        <p:cond evt="onBegin" delay="0">
+                          <p:tn val="2"/>
+                        </p:cond>
+                      </p:stCondLst>
+                      <p:childTnLst>
+                        <p:par>
+                          <p:cTn id="4" fill="hold">
+                            <p:stCondLst>
+                              <p:cond delay="0"/>
+                            </p:stCondLst>
+                            <p:childTnLst>
+                              <p:par>
+                                <p:cTn id="5" presetID="2" presetClass="entr" presetSubtype="8" decel="100000" fill="hold" grpId="0" nodeType="withEffect">
+                                  <p:stCondLst>
+                                    <p:cond delay="0"/>
+                                  </p:stCondLst>
+                                  <p:childTnLst>
+                                    <p:set>
+                                      <p:cBhvr>
+                                        <p:cTn id="6" dur="1" fill="hold">
+                                          <p:stCondLst>
+                                            <p:cond delay="0"/>
+                                          </p:stCondLst>
+                                        </p:cTn>
+                                        <p:tgtEl>
+                                          <p:spTgt spid="2"/>
+                                        </p:tgtEl>
+                                        <p:attrNameLst>
+                                          <p:attrName>style.visibility</p:attrName>
+                                        </p:attrNameLst>
+                                      </p:cBhvr>
+                                      <p:to>
+                                        <p:strVal val="visible"/>
+                                      </p:to>
+                                    </p:set>
+                                    <p:anim calcmode="lin" valueType="num">
+                                      <p:cBhvr additive="base">
+                                        <p:cTn id="7" dur="1000" fill="hold"/>
+                                        <p:tgtEl>
+                                          <p:spTgt spid="2"/>
+                                        </p:tgtEl>
+                                        <p:attrNameLst>
+                                          <p:attrName>ppt_x</p:attrName>
+                                        </p:attrNameLst>
+                                      </p:cBhvr>
+                                      <p:tavLst>
+                                        <p:tav tm="0">
+                                          <p:val>
+                                            <p:strVal val="0-#ppt_w/2"/>
+                                          </p:val>
+                                        </p:tav>
+                                        <p:tav tm="100000">
+                                          <p:val>
+                                            <p:strVal val="#ppt_x"/>
+                                          </p:val>
+                                        </p:tav>
+                                      </p:tavLst>
+                                    </p:anim>
+                                    <p:anim calcmode="lin" valueType="num">
+                                      <p:cBhvr additive="base">
+                                        <p:cTn id="8" dur="1000" fill="hold"/>
+                                        <p:tgtEl>
+                                          <p:spTgt spid="2"/>
+                                        </p:tgtEl>
+                                        <p:attrNameLst>
+                                          <p:attrName>ppt_y</p:attrName>
+                                        </p:attrNameLst>
+                                      </p:cBhvr>
+                                      <p:tavLst>
+                                        <p:tav tm="0">
+                                          <p:val>
+                                            <p:strVal val="#ppt_y"/>
+                                          </p:val>
+                                        </p:tav>
+                                        <p:tav tm="100000">
+                                          <p:val>
+                                            <p:strVal val="#ppt_y"/>
+                                          </p:val>
+                                        </p:tav>
+                                      </p:tavLst>
+                                    </p:anim>
+                                  </p:childTnLst>
+                                </p:cTn>
+                              </p:par>
+                            </p:childTnLst>
+                          </p:cTn>
+                        </p:par>
+                        <p:par>
+                          <p:cTn id="9" fill="hold">
+                            <p:stCondLst>
+                              <p:cond delay="1000"/>
+                            </p:stCondLst>
+                            <p:childTnLst>
+                              <p:par>
+                                <p:cTn id="10" presetID="2" presetClass="entr" presetSubtype="4" fill="hold" nodeType="afterEffect">
+                                  <p:stCondLst>
+                                    <p:cond delay="0"/>
+                                  </p:stCondLst>
+                                  <p:childTnLst>
+                                    <p:set>
+                                      <p:cBhvr>
+                                        <p:cTn id="11" dur="1" fill="hold">
+                                          <p:stCondLst>
+                                            <p:cond delay="0"/>
+                                          </p:stCondLst>
+                                        </p:cTn>
+                                        <p:tgtEl>
+                                          <p:spTgt spid="4"/>
+                                        </p:tgtEl>
+                                        <p:attrNameLst>
+                                          <p:attrName>style.visibility</p:attrName>
+                                        </p:attrNameLst>
+                                      </p:cBhvr>
+                                      <p:to>
+                                        <p:strVal val="visible"/>
+                                      </p:to>
+                                    </p:set>
+                                    <p:anim calcmode="lin" valueType="num">
+                                      <p:cBhvr additive="base">
+                                        <p:cTn id="12" dur="500" fill="hold"/>
+                                        <p:tgtEl>
+                                          <p:spTgt spid="4"/>
+                                        </p:tgtEl>
+                                        <p:attrNameLst>
+                                          <p:attrName>ppt_x</p:attrName>
+                                        </p:attrNameLst>
+                                      </p:cBhvr>
+                                      <p:tavLst>
+                                        <p:tav tm="0">
+                                          <p:val>
+                                            <p:strVal val="#ppt_x"/>
+                                          </p:val>
+                                        </p:tav>
+                                        <p:tav tm="100000">
+                                          <p:val>
+                                            <p:strVal val="#ppt_x"/>
+                                          </p:val>
+                                        </p:tav>
+                                      </p:tavLst>
+                                    </p:anim>
+                                    <p:anim calcmode="lin" valueType="num">
+                                      <p:cBhvr additive="base">
+                                        <p:cTn id="13" dur="500" fill="hold"/>
+                                        <p:tgtEl>
+                                          <p:spTgt spid="4"/>
+                                        </p:tgtEl>
+                                        <p:attrNameLst>
+                                          <p:attrName>ppt_y</p:attrName>
+                                        </p:attrNameLst>
+                                      </p:cBhvr>
+                                      <p:tavLst>
+                                        <p:tav tm="0">
+                                          <p:val>
+                                            <p:strVal val="1+#ppt_h/2"/>
+                                          </p:val>
+                                        </p:tav>
+                                        <p:tav tm="100000">
+                                          <p:val>
+                                            <p:strVal val="#ppt_y"/>
+                                          </p:val>
+                                        </p:tav>
+                                      </p:tavLst>
+                                    </p:anim>
+                                  </p:childTnLst>
+                                </p:cTn>
+                              </p:par>
+                            </p:childTnLst>
+                          </p:cTn>
+                        </p:par>
+                      </p:childTnLst>
+                    </p:cTn>
+                  </p:par>
+                </p:childTnLst>
+              </p:cTn>
+              <p:prevCondLst>
+                <p:cond evt="onPrev" delay="0">
+                  <p:tgtEl>
+                    <p:sldTgt/>
+                  </p:tgtEl>
+                </p:cond>
+              </p:prevCondLst>
+              <p:nextCondLst>
+                <p:cond evt="onNext" delay="0">
+                  <p:tgtEl>
+                    <p:sldTgt/>
+                  </p:tgtEl>
+                </p:cond>
+              </p:nextCondLst>
+            </p:seq>
+          </p:childTnLst>
+        </p:cTn>
+      </p:par>
+    </p:tnLst>
+    <p:bldLst>
+      <p:bldP spid="2" grpId="0"/>
+    </p:bldLst>
+  </p:timing>
+</p:sld>
+</file>
+
+<file path=ppt/slides/slide8.xml><?xml version="1.0" encoding="utf-8"?>
+<p:sld xmlns:a="http://schemas.openxmlformats.org/drawingml/2006/main" xmlns:r="http://schemas.openxmlformats.org/officeDocument/2006/relationships" xmlns:p="http://schemas.openxmlformats.org/presentationml/2006/main">
+  <p:cSld>
+    <p:spTree>
+      <p:nvGrpSpPr>
+        <p:cNvPr id="1" name=""/>
+        <p:cNvGrpSpPr/>
+        <p:nvPr/>
+      </p:nvGrpSpPr>
+      <p:grpSpPr>
+        <a:xfrm>
+          <a:off x="0" y="0"/>
+          <a:ext cx="0" cy="0"/>
+          <a:chOff x="0" y="0"/>
+          <a:chExt cx="0" cy="0"/>
+        </a:xfrm>
+      </p:grpSpPr>
+      <p:sp>
+        <p:nvSpPr>
+          <p:cNvPr id="33" name="Marcador de texto 4"/>
+          <p:cNvSpPr txBox="1">
+            <a:spLocks/>
+          </p:cNvSpPr>
+          <p:nvPr/>
+        </p:nvSpPr>
+        <p:spPr>
+          <a:xfrm>
+            <a:off x="2246688" y="1053149"/>
+            <a:ext cx="17101901" cy="1802637"/>
+          </a:xfrm>
+          <a:prstGeom prst="rect">
+            <a:avLst/>
+          </a:prstGeom>
+        </p:spPr>
+        <p:txBody>
+          <a:bodyPr/>
+          <a:lstStyle>
+            <a:lvl1pPr marL="0" indent="0" algn="l" defTabSz="1812040" rtl="0" eaLnBrk="1" latinLnBrk="0" hangingPunct="1">
+              <a:spcBef>
+                <a:spcPct val="20000"/>
+              </a:spcBef>
+              <a:spcAft>
+                <a:spcPts val="1199"/>
+              </a:spcAft>
+              <a:buFont typeface="Arial" pitchFamily="34" charset="0"/>
+              <a:buNone/>
+              <a:defRPr sz="4000" b="1" kern="1200">
+                <a:solidFill>
+                  <a:schemeClr val="tx1"/>
+                </a:solidFill>
+                <a:latin typeface="+mn-lt"/>
+                <a:ea typeface="+mn-ea"/>
+                <a:cs typeface="+mn-cs"/>
+              </a:defRPr>
+            </a:lvl1pPr>
+            <a:lvl2pPr marL="906009" indent="-362365" algn="l" defTabSz="1812040" rtl="0" eaLnBrk="1" latinLnBrk="0" hangingPunct="1">
+              <a:spcBef>
+                <a:spcPct val="20000"/>
+              </a:spcBef>
+              <a:buClr>
+                <a:schemeClr val="tx2"/>
+              </a:buClr>
+              <a:buFont typeface="Arial" pitchFamily="34" charset="0"/>
+              <a:buChar char="•"/>
+              <a:defRPr sz="4000" kern="1200">
+                <a:solidFill>
+                  <a:schemeClr val="tx1"/>
+                </a:solidFill>
+                <a:latin typeface="+mn-lt"/>
+                <a:ea typeface="+mn-ea"/>
+                <a:cs typeface="+mn-cs"/>
+              </a:defRPr>
+            </a:lvl2pPr>
+            <a:lvl3pPr marL="2265040" indent="-453004" algn="l" defTabSz="1812040" rtl="0" eaLnBrk="1" latinLnBrk="0" hangingPunct="1">
+              <a:spcBef>
+                <a:spcPct val="20000"/>
+              </a:spcBef>
+              <a:buClr>
+                <a:schemeClr val="tx2"/>
+              </a:buClr>
+              <a:buFont typeface="Arial" pitchFamily="34" charset="0"/>
+              <a:buChar char="•"/>
+              <a:defRPr sz="3702" kern="1200">
+                <a:solidFill>
+                  <a:schemeClr val="tx1"/>
+                </a:solidFill>
+                <a:latin typeface="+mn-lt"/>
+                <a:ea typeface="+mn-ea"/>
+                <a:cs typeface="+mn-cs"/>
+              </a:defRPr>
+            </a:lvl3pPr>
+            <a:lvl4pPr marL="3171046" indent="-453004" algn="l" defTabSz="1812040" rtl="0" eaLnBrk="1" latinLnBrk="0" hangingPunct="1">
+              <a:spcBef>
+                <a:spcPct val="20000"/>
+              </a:spcBef>
+              <a:buClr>
+                <a:schemeClr val="tx2"/>
+              </a:buClr>
+              <a:buFont typeface="Arial" pitchFamily="34" charset="0"/>
+              <a:buChar char="•"/>
+              <a:defRPr sz="3702" kern="1200">
+                <a:solidFill>
+                  <a:schemeClr val="tx1"/>
+                </a:solidFill>
+                <a:latin typeface="+mn-lt"/>
+                <a:ea typeface="+mn-ea"/>
+                <a:cs typeface="+mn-cs"/>
+              </a:defRPr>
+            </a:lvl4pPr>
+            <a:lvl5pPr marL="4077068" indent="-453004" algn="l" defTabSz="1812040" rtl="0" eaLnBrk="1" latinLnBrk="0" hangingPunct="1">
+              <a:spcBef>
+                <a:spcPct val="20000"/>
+              </a:spcBef>
+              <a:buClr>
+                <a:schemeClr val="tx2"/>
+              </a:buClr>
+              <a:buFont typeface="Arial" pitchFamily="34" charset="0"/>
+              <a:buChar char="•"/>
+              <a:defRPr sz="3702" kern="1200" baseline="0">
+                <a:solidFill>
+                  <a:schemeClr val="tx1"/>
+                </a:solidFill>
+                <a:latin typeface="+mn-lt"/>
+                <a:ea typeface="+mn-ea"/>
+                <a:cs typeface="+mn-cs"/>
+              </a:defRPr>
+            </a:lvl5pPr>
+            <a:lvl6pPr marL="4983081" indent="-453004" algn="l" defTabSz="1812040" rtl="0" eaLnBrk="1" latinLnBrk="0" hangingPunct="1">
+              <a:spcBef>
+                <a:spcPct val="20000"/>
+              </a:spcBef>
+              <a:buClr>
+                <a:schemeClr val="tx2"/>
+              </a:buClr>
+              <a:buFont typeface="Arial" pitchFamily="34" charset="0"/>
+              <a:buChar char="•"/>
+              <a:defRPr sz="3200" kern="1200">
+                <a:solidFill>
+                  <a:schemeClr val="tx1"/>
+                </a:solidFill>
+                <a:latin typeface="+mn-lt"/>
+                <a:ea typeface="+mn-ea"/>
+                <a:cs typeface="+mn-cs"/>
+              </a:defRPr>
+            </a:lvl6pPr>
+            <a:lvl7pPr marL="5889088" indent="-453004" algn="l" defTabSz="1812040" rtl="0" eaLnBrk="1" latinLnBrk="0" hangingPunct="1">
+              <a:spcBef>
+                <a:spcPct val="20000"/>
+              </a:spcBef>
+              <a:buClr>
+                <a:schemeClr val="tx2"/>
+              </a:buClr>
+              <a:buFont typeface="Arial" pitchFamily="34" charset="0"/>
+              <a:buChar char="•"/>
+              <a:defRPr sz="3200" kern="1200">
+                <a:solidFill>
+                  <a:schemeClr val="tx1"/>
+                </a:solidFill>
+                <a:latin typeface="+mn-lt"/>
+                <a:ea typeface="+mn-ea"/>
+                <a:cs typeface="+mn-cs"/>
+              </a:defRPr>
+            </a:lvl7pPr>
+            <a:lvl8pPr marL="6795112" indent="-453004" algn="l" defTabSz="1812040" rtl="0" eaLnBrk="1" latinLnBrk="0" hangingPunct="1">
+              <a:spcBef>
+                <a:spcPct val="20000"/>
+              </a:spcBef>
+              <a:buClr>
+                <a:schemeClr val="tx2"/>
+              </a:buClr>
+              <a:buFont typeface="Arial" pitchFamily="34" charset="0"/>
+              <a:buChar char="•"/>
+              <a:defRPr sz="3200" kern="1200">
+                <a:solidFill>
+                  <a:schemeClr val="tx1"/>
+                </a:solidFill>
+                <a:latin typeface="+mn-lt"/>
+                <a:ea typeface="+mn-ea"/>
+                <a:cs typeface="+mn-cs"/>
+              </a:defRPr>
+            </a:lvl8pPr>
+            <a:lvl9pPr marL="7701118" indent="-453004" algn="l" defTabSz="1812040" rtl="0" eaLnBrk="1" latinLnBrk="0" hangingPunct="1">
+              <a:spcBef>
+                <a:spcPct val="20000"/>
+              </a:spcBef>
+              <a:buClr>
+                <a:schemeClr val="tx2"/>
+              </a:buClr>
+              <a:buFont typeface="Arial" pitchFamily="34" charset="0"/>
+              <a:buChar char="•"/>
+              <a:defRPr sz="3200" kern="1200">
+                <a:solidFill>
+                  <a:schemeClr val="tx1"/>
+                </a:solidFill>
+                <a:latin typeface="+mn-lt"/>
+                <a:ea typeface="+mn-ea"/>
+                <a:cs typeface="+mn-cs"/>
+              </a:defRPr>
+            </a:lvl9pPr>
+          </a:lstStyle>
+          <a:p>
+            <a:r>
+              <a:rPr lang="en-US" sz="4400" dirty="0" smtClean="0">
+                <a:solidFill>
+                  <a:schemeClr val="accent3">
+                    <a:lumMod val="75000"/>
+                  </a:schemeClr>
+                </a:solidFill>
+                <a:ea typeface="Open Sans Semibold" panose="020B0706030804020204" pitchFamily="34" charset="0"/>
+                <a:cs typeface="Open Sans Semibold" panose="020B0706030804020204" pitchFamily="34" charset="0"/>
+              </a:rPr>
+              <a:t>Module Review + Questions and Answers</a:t>
+            </a:r>
+            <a:endParaRPr lang="en-US" sz="4400" dirty="0">
+              <a:solidFill>
+                <a:schemeClr val="accent3">
+                  <a:lumMod val="75000"/>
+                </a:schemeClr>
+              </a:solidFill>
+              <a:ea typeface="Open Sans Semibold" panose="020B0706030804020204" pitchFamily="34" charset="0"/>
+              <a:cs typeface="Open Sans Semibold" panose="020B0706030804020204" pitchFamily="34" charset="0"/>
+            </a:endParaRPr>
+          </a:p>
+        </p:txBody>
+      </p:sp>
+      <p:cxnSp>
+        <p:nvCxnSpPr>
+          <p:cNvPr id="34" name="10 Conector recto"/>
+          <p:cNvCxnSpPr/>
+          <p:nvPr/>
+        </p:nvCxnSpPr>
+        <p:spPr>
+          <a:xfrm>
+            <a:off x="2246688" y="1955687"/>
+            <a:ext cx="9766086" cy="0"/>
+          </a:xfrm>
+          <a:prstGeom prst="line">
+            <a:avLst/>
+          </a:prstGeom>
+          <a:ln w="57150">
+            <a:solidFill>
+              <a:srgbClr val="C00000"/>
+            </a:solidFill>
+          </a:ln>
+        </p:spPr>
+        <p:style>
+          <a:lnRef idx="1">
+            <a:schemeClr val="accent1"/>
+          </a:lnRef>
+          <a:fillRef idx="0">
+            <a:schemeClr val="accent1"/>
+          </a:fillRef>
+          <a:effectRef idx="0">
+            <a:schemeClr val="accent1"/>
+          </a:effectRef>
+          <a:fontRef idx="minor">
+            <a:schemeClr val="tx1"/>
+          </a:fontRef>
+        </p:style>
+      </p:cxnSp>
+      <p:sp>
+        <p:nvSpPr>
+          <p:cNvPr id="35" name="TextBox 34"/>
+          <p:cNvSpPr txBox="1"/>
+          <p:nvPr/>
+        </p:nvSpPr>
+        <p:spPr>
+          <a:xfrm>
+            <a:off x="2246688" y="2855786"/>
+            <a:ext cx="19982220" cy="646331"/>
+          </a:xfrm>
+          <a:prstGeom prst="rect">
+            <a:avLst/>
+          </a:prstGeom>
+          <a:noFill/>
+        </p:spPr>
+        <p:txBody>
+          <a:bodyPr wrap="square" rtlCol="0">
+            <a:spAutoFit/>
+          </a:bodyPr>
+          <a:lstStyle/>
+          <a:p>
+            <a:pPr marL="571500" indent="-571500">
+              <a:buFont typeface="Arial" panose="020B0604020202020204" pitchFamily="34" charset="0"/>
+              <a:buChar char="•"/>
+            </a:pPr>
+            <a:r>
+              <a:rPr lang="en-US" sz="3600" dirty="0" smtClean="0"/>
+              <a:t>Do you have any doubts, concerns, questions that you would like to clarify?</a:t>
+            </a:r>
+            <a:endParaRPr lang="en-US" sz="3600" dirty="0"/>
+          </a:p>
+        </p:txBody>
+      </p:sp>
+    </p:spTree>
+    <p:extLst>
+      <p:ext uri="{BB962C8B-B14F-4D97-AF65-F5344CB8AC3E}">
+        <p14:creationId xmlns:p14="http://schemas.microsoft.com/office/powerpoint/2010/main" val="1004179362"/>
+      </p:ext>
+    </p:extLst>
+  </p:cSld>
+  <p:clrMapOvr>
+    <a:masterClrMapping/>
+  </p:clrMapOvr>
+  <p:timing>
+    <p:tnLst>
+      <p:par>
+        <p:cTn id="1" dur="indefinite" restart="never" nodeType="tmRoot">
+          <p:childTnLst>
+            <p:seq concurrent="1" nextAc="seek">
+              <p:cTn id="2" dur="indefinite" nodeType="mainSeq">
+                <p:childTnLst>
+                  <p:par>
+                    <p:cTn id="3" fill="hold">
+                      <p:stCondLst>
+                        <p:cond delay="indefinite"/>
+                        <p:cond evt="onBegin" delay="0">
+                          <p:tn val="2"/>
+                        </p:cond>
+                      </p:stCondLst>
+                      <p:childTnLst>
+                        <p:par>
+                          <p:cTn id="4" fill="hold">
+                            <p:stCondLst>
+                              <p:cond delay="0"/>
+                            </p:stCondLst>
+                            <p:childTnLst>
+                              <p:par>
+                                <p:cTn id="5" presetID="2" presetClass="entr" presetSubtype="8" decel="100000" fill="hold" grpId="0" nodeType="withEffect">
+                                  <p:stCondLst>
+                                    <p:cond delay="0"/>
+                                  </p:stCondLst>
+                                  <p:childTnLst>
+                                    <p:set>
+                                      <p:cBhvr>
+                                        <p:cTn id="6" dur="1" fill="hold">
+                                          <p:stCondLst>
+                                            <p:cond delay="0"/>
+                                          </p:stCondLst>
+                                        </p:cTn>
+                                        <p:tgtEl>
+                                          <p:spTgt spid="33"/>
+                                        </p:tgtEl>
+                                        <p:attrNameLst>
+                                          <p:attrName>style.visibility</p:attrName>
+                                        </p:attrNameLst>
+                                      </p:cBhvr>
+                                      <p:to>
+                                        <p:strVal val="visible"/>
+                                      </p:to>
+                                    </p:set>
+                                    <p:anim calcmode="lin" valueType="num">
+                                      <p:cBhvr additive="base">
+                                        <p:cTn id="7" dur="1000" fill="hold"/>
+                                        <p:tgtEl>
+                                          <p:spTgt spid="33"/>
+                                        </p:tgtEl>
+                                        <p:attrNameLst>
+                                          <p:attrName>ppt_x</p:attrName>
+                                        </p:attrNameLst>
+                                      </p:cBhvr>
+                                      <p:tavLst>
+                                        <p:tav tm="0">
+                                          <p:val>
+                                            <p:strVal val="0-#ppt_w/2"/>
+                                          </p:val>
+                                        </p:tav>
+                                        <p:tav tm="100000">
+                                          <p:val>
+                                            <p:strVal val="#ppt_x"/>
+                                          </p:val>
+                                        </p:tav>
+                                      </p:tavLst>
+                                    </p:anim>
+                                    <p:anim calcmode="lin" valueType="num">
+                                      <p:cBhvr additive="base">
+                                        <p:cTn id="8" dur="1000" fill="hold"/>
+                                        <p:tgtEl>
+                                          <p:spTgt spid="33"/>
+                                        </p:tgtEl>
+                                        <p:attrNameLst>
+                                          <p:attrName>ppt_y</p:attrName>
+                                        </p:attrNameLst>
+                                      </p:cBhvr>
+                                      <p:tavLst>
+                                        <p:tav tm="0">
+                                          <p:val>
+                                            <p:strVal val="#ppt_y"/>
+                                          </p:val>
+                                        </p:tav>
+                                        <p:tav tm="100000">
+                                          <p:val>
+                                            <p:strVal val="#ppt_y"/>
+                                          </p:val>
+                                        </p:tav>
+                                      </p:tavLst>
+                                    </p:anim>
+                                  </p:childTnLst>
+                                </p:cTn>
+                              </p:par>
+                            </p:childTnLst>
+                          </p:cTn>
+                        </p:par>
+                        <p:par>
+                          <p:cTn id="9" fill="hold">
+                            <p:stCondLst>
+                              <p:cond delay="1000"/>
+                            </p:stCondLst>
+                            <p:childTnLst>
+                              <p:par>
+                                <p:cTn id="10" presetID="2" presetClass="entr" presetSubtype="4" fill="hold" nodeType="afterEffect">
+                                  <p:stCondLst>
+                                    <p:cond delay="0"/>
+                                  </p:stCondLst>
+                                  <p:childTnLst>
+                                    <p:set>
+                                      <p:cBhvr>
+                                        <p:cTn id="11" dur="1" fill="hold">
+                                          <p:stCondLst>
+                                            <p:cond delay="0"/>
+                                          </p:stCondLst>
+                                        </p:cTn>
+                                        <p:tgtEl>
+                                          <p:spTgt spid="34"/>
+                                        </p:tgtEl>
+                                        <p:attrNameLst>
+                                          <p:attrName>style.visibility</p:attrName>
+                                        </p:attrNameLst>
+                                      </p:cBhvr>
+                                      <p:to>
+                                        <p:strVal val="visible"/>
+                                      </p:to>
+                                    </p:set>
+                                    <p:anim calcmode="lin" valueType="num">
+                                      <p:cBhvr additive="base">
+                                        <p:cTn id="12" dur="500" fill="hold"/>
+                                        <p:tgtEl>
+                                          <p:spTgt spid="34"/>
+                                        </p:tgtEl>
+                                        <p:attrNameLst>
+                                          <p:attrName>ppt_x</p:attrName>
+                                        </p:attrNameLst>
+                                      </p:cBhvr>
+                                      <p:tavLst>
+                                        <p:tav tm="0">
+                                          <p:val>
+                                            <p:strVal val="#ppt_x"/>
+                                          </p:val>
+                                        </p:tav>
+                                        <p:tav tm="100000">
+                                          <p:val>
+                                            <p:strVal val="#ppt_x"/>
+                                          </p:val>
+                                        </p:tav>
+                                      </p:tavLst>
+                                    </p:anim>
+                                    <p:anim calcmode="lin" valueType="num">
+                                      <p:cBhvr additive="base">
+                                        <p:cTn id="13" dur="500" fill="hold"/>
+                                        <p:tgtEl>
+                                          <p:spTgt spid="34"/>
+                                        </p:tgtEl>
+                                        <p:attrNameLst>
+                                          <p:attrName>ppt_y</p:attrName>
+                                        </p:attrNameLst>
+                                      </p:cBhvr>
+                                      <p:tavLst>
+                                        <p:tav tm="0">
+                                          <p:val>
+                                            <p:strVal val="1+#ppt_h/2"/>
+                                          </p:val>
+                                        </p:tav>
+                                        <p:tav tm="100000">
+                                          <p:val>
+                                            <p:strVal val="#ppt_y"/>
+                                          </p:val>
+                                        </p:tav>
+                                      </p:tavLst>
+                                    </p:anim>
+                                  </p:childTnLst>
+                                </p:cTn>
+                              </p:par>
+                            </p:childTnLst>
+                          </p:cTn>
+                        </p:par>
+                      </p:childTnLst>
+                    </p:cTn>
+                  </p:par>
+                </p:childTnLst>
+              </p:cTn>
+              <p:prevCondLst>
+                <p:cond evt="onPrev" delay="0">
+                  <p:tgtEl>
+                    <p:sldTgt/>
+                  </p:tgtEl>
+                </p:cond>
+              </p:prevCondLst>
+              <p:nextCondLst>
+                <p:cond evt="onNext" delay="0">
+                  <p:tgtEl>
+                    <p:sldTgt/>
+                  </p:tgtEl>
+                </p:cond>
+              </p:nextCondLst>
+            </p:seq>
+          </p:childTnLst>
+        </p:cTn>
+      </p:par>
+    </p:tnLst>
+    <p:bldLst>
+      <p:bldP spid="33" grpId="0"/>
+    </p:bldLst>
+  </p:timing>
+</p:sld>
+</file>
+
+<file path=ppt/slides/slide9.xml><?xml version="1.0" encoding="utf-8"?>
+<p:sld xmlns:a="http://schemas.openxmlformats.org/drawingml/2006/main" xmlns:r="http://schemas.openxmlformats.org/officeDocument/2006/relationships" xmlns:p="http://schemas.openxmlformats.org/presentationml/2006/main">
+  <p:cSld>
+    <p:spTree>
+      <p:nvGrpSpPr>
+        <p:cNvPr id="1" name=""/>
+        <p:cNvGrpSpPr/>
+        <p:nvPr/>
+      </p:nvGrpSpPr>
+      <p:grpSpPr>
+        <a:xfrm>
+          <a:off x="0" y="0"/>
+          <a:ext cx="0" cy="0"/>
+          <a:chOff x="0" y="0"/>
+          <a:chExt cx="0" cy="0"/>
+        </a:xfrm>
+      </p:grpSpPr>
+      <p:sp>
+        <p:nvSpPr>
           <p:cNvPr id="6" name="2 Título"/>
           <p:cNvSpPr>
             <a:spLocks noGrp="1"/>
@@ -26338,7 +29864,7 @@
             <a:fld id="{FF439014-E629-42E3-A58B-61A0F1C8CFFE}" type="slidenum">
               <a:rPr lang="es-SV" smtClean="0"/>
               <a:pPr/>
-              <a:t>5</a:t>
+              <a:t>9</a:t>
             </a:fld>
             <a:endParaRPr lang="es-SV"/>
           </a:p>

</xml_diff>